<commit_message>
Added XY8 & NMR
</commit_message>
<xml_diff>
--- a/examples/nv-centers/syncing-opx-with-external-devices/NV_Experiments_with_the_OPX.pptx
+++ b/examples/nv-centers/syncing-opx-with-external-devices/NV_Experiments_with_the_OPX.pptx
@@ -5,7 +5,7 @@
     <p:sldMasterId id="2147483648" r:id="rId4"/>
   </p:sldMasterIdLst>
   <p:notesMasterIdLst>
-    <p:notesMasterId r:id="rId25"/>
+    <p:notesMasterId r:id="rId26"/>
   </p:notesMasterIdLst>
   <p:sldIdLst>
     <p:sldId id="1255" r:id="rId5"/>
@@ -24,10 +24,11 @@
     <p:sldId id="1278" r:id="rId18"/>
     <p:sldId id="1279" r:id="rId19"/>
     <p:sldId id="1259" r:id="rId20"/>
-    <p:sldId id="1263" r:id="rId21"/>
-    <p:sldId id="1260" r:id="rId22"/>
-    <p:sldId id="1256" r:id="rId23"/>
-    <p:sldId id="1261" r:id="rId24"/>
+    <p:sldId id="1280" r:id="rId21"/>
+    <p:sldId id="1263" r:id="rId22"/>
+    <p:sldId id="1260" r:id="rId23"/>
+    <p:sldId id="1256" r:id="rId24"/>
+    <p:sldId id="1261" r:id="rId25"/>
   </p:sldIdLst>
   <p:sldSz cx="12192000" cy="6858000"/>
   <p:notesSz cx="6858000" cy="9144000"/>
@@ -2181,7 +2182,7 @@
           <a:p>
             <a:fld id="{EB47E7A2-FA97-4112-BE9D-6874B6DF8B26}" type="datetimeFigureOut">
               <a:rPr lang="en-US" smtClean="0"/>
-              <a:t>1/10/2021</a:t>
+              <a:t>1/11/2021</a:t>
             </a:fld>
             <a:endParaRPr lang="en-US"/>
           </a:p>
@@ -2595,7 +2596,7 @@
           <a:p>
             <a:fld id="{7231506B-070F-49D7-99F9-EB2DBE64CD22}" type="datetimeFigureOut">
               <a:rPr lang="en-US" smtClean="0"/>
-              <a:t>1/10/2021</a:t>
+              <a:t>1/11/2021</a:t>
             </a:fld>
             <a:endParaRPr lang="en-US"/>
           </a:p>
@@ -2793,7 +2794,7 @@
           <a:p>
             <a:fld id="{7231506B-070F-49D7-99F9-EB2DBE64CD22}" type="datetimeFigureOut">
               <a:rPr lang="en-US" smtClean="0"/>
-              <a:t>1/10/2021</a:t>
+              <a:t>1/11/2021</a:t>
             </a:fld>
             <a:endParaRPr lang="en-US"/>
           </a:p>
@@ -3001,7 +3002,7 @@
           <a:p>
             <a:fld id="{7231506B-070F-49D7-99F9-EB2DBE64CD22}" type="datetimeFigureOut">
               <a:rPr lang="en-US" smtClean="0"/>
-              <a:t>1/10/2021</a:t>
+              <a:t>1/11/2021</a:t>
             </a:fld>
             <a:endParaRPr lang="en-US"/>
           </a:p>
@@ -3199,7 +3200,7 @@
           <a:p>
             <a:fld id="{7231506B-070F-49D7-99F9-EB2DBE64CD22}" type="datetimeFigureOut">
               <a:rPr lang="en-US" smtClean="0"/>
-              <a:t>1/10/2021</a:t>
+              <a:t>1/11/2021</a:t>
             </a:fld>
             <a:endParaRPr lang="en-US"/>
           </a:p>
@@ -3474,7 +3475,7 @@
           <a:p>
             <a:fld id="{7231506B-070F-49D7-99F9-EB2DBE64CD22}" type="datetimeFigureOut">
               <a:rPr lang="en-US" smtClean="0"/>
-              <a:t>1/10/2021</a:t>
+              <a:t>1/11/2021</a:t>
             </a:fld>
             <a:endParaRPr lang="en-US"/>
           </a:p>
@@ -3739,7 +3740,7 @@
           <a:p>
             <a:fld id="{7231506B-070F-49D7-99F9-EB2DBE64CD22}" type="datetimeFigureOut">
               <a:rPr lang="en-US" smtClean="0"/>
-              <a:t>1/10/2021</a:t>
+              <a:t>1/11/2021</a:t>
             </a:fld>
             <a:endParaRPr lang="en-US"/>
           </a:p>
@@ -4151,7 +4152,7 @@
           <a:p>
             <a:fld id="{7231506B-070F-49D7-99F9-EB2DBE64CD22}" type="datetimeFigureOut">
               <a:rPr lang="en-US" smtClean="0"/>
-              <a:t>1/10/2021</a:t>
+              <a:t>1/11/2021</a:t>
             </a:fld>
             <a:endParaRPr lang="en-US"/>
           </a:p>
@@ -4292,7 +4293,7 @@
           <a:p>
             <a:fld id="{7231506B-070F-49D7-99F9-EB2DBE64CD22}" type="datetimeFigureOut">
               <a:rPr lang="en-US" smtClean="0"/>
-              <a:t>1/10/2021</a:t>
+              <a:t>1/11/2021</a:t>
             </a:fld>
             <a:endParaRPr lang="en-US"/>
           </a:p>
@@ -4405,7 +4406,7 @@
           <a:p>
             <a:fld id="{7231506B-070F-49D7-99F9-EB2DBE64CD22}" type="datetimeFigureOut">
               <a:rPr lang="en-US" smtClean="0"/>
-              <a:t>1/10/2021</a:t>
+              <a:t>1/11/2021</a:t>
             </a:fld>
             <a:endParaRPr lang="en-US"/>
           </a:p>
@@ -4716,7 +4717,7 @@
           <a:p>
             <a:fld id="{7231506B-070F-49D7-99F9-EB2DBE64CD22}" type="datetimeFigureOut">
               <a:rPr lang="en-US" smtClean="0"/>
-              <a:t>1/10/2021</a:t>
+              <a:t>1/11/2021</a:t>
             </a:fld>
             <a:endParaRPr lang="en-US"/>
           </a:p>
@@ -5007,7 +5008,7 @@
           <a:p>
             <a:fld id="{7231506B-070F-49D7-99F9-EB2DBE64CD22}" type="datetimeFigureOut">
               <a:rPr lang="en-US" smtClean="0"/>
-              <a:t>1/10/2021</a:t>
+              <a:t>1/11/2021</a:t>
             </a:fld>
             <a:endParaRPr lang="en-US"/>
           </a:p>
@@ -5285,7 +5286,7 @@
             <a:fld id="{7231506B-070F-49D7-99F9-EB2DBE64CD22}" type="datetimeFigureOut">
               <a:rPr lang="en-US" smtClean="0"/>
               <a:pPr/>
-              <a:t>1/10/2021</a:t>
+              <a:t>1/11/2021</a:t>
             </a:fld>
             <a:endParaRPr lang="en-US" dirty="0"/>
           </a:p>
@@ -10845,7 +10846,7 @@
           <a:p>
             <a:r>
               <a:rPr lang="en-US" dirty="0"/>
-              <a:t>Widefield ODMR - Setup</a:t>
+              <a:t>Widefield ODMR Setup</a:t>
             </a:r>
             <a:endParaRPr lang="en-IL" dirty="0"/>
           </a:p>
@@ -12845,9 +12846,9 @@
         <p:grpSpPr>
           <a:xfrm>
             <a:off x="2643623" y="1547459"/>
-            <a:ext cx="6628297" cy="4755529"/>
+            <a:ext cx="6128821" cy="4755529"/>
             <a:chOff x="2735938" y="1140681"/>
-            <a:chExt cx="7313633" cy="5247229"/>
+            <a:chExt cx="6762513" cy="5247229"/>
           </a:xfrm>
         </p:grpSpPr>
         <p:pic>
@@ -13432,6 +13433,1906 @@
         </p:sp>
         <p:cxnSp>
           <p:nvCxnSpPr>
+            <p:cNvPr id="28" name="Straight Connector 27">
+              <a:extLst>
+                <a:ext uri="{FF2B5EF4-FFF2-40B4-BE49-F238E27FC236}">
+                  <a16:creationId xmlns:a16="http://schemas.microsoft.com/office/drawing/2014/main" id="{BD1C6FB7-BCE8-467D-8797-F87F0F63C013}"/>
+                </a:ext>
+              </a:extLst>
+            </p:cNvPr>
+            <p:cNvCxnSpPr>
+              <a:cxnSpLocks/>
+            </p:cNvCxnSpPr>
+            <p:nvPr/>
+          </p:nvCxnSpPr>
+          <p:spPr>
+            <a:xfrm flipH="1" flipV="1">
+              <a:off x="7997259" y="6004407"/>
+              <a:ext cx="1318493" cy="5991"/>
+            </a:xfrm>
+            <a:prstGeom prst="line">
+              <a:avLst/>
+            </a:prstGeom>
+            <a:ln w="28575">
+              <a:solidFill>
+                <a:srgbClr val="FF0000"/>
+              </a:solidFill>
+            </a:ln>
+          </p:spPr>
+          <p:style>
+            <a:lnRef idx="3">
+              <a:schemeClr val="accent1"/>
+            </a:lnRef>
+            <a:fillRef idx="0">
+              <a:schemeClr val="accent1"/>
+            </a:fillRef>
+            <a:effectRef idx="2">
+              <a:schemeClr val="accent1"/>
+            </a:effectRef>
+            <a:fontRef idx="minor">
+              <a:schemeClr val="tx1"/>
+            </a:fontRef>
+          </p:style>
+        </p:cxnSp>
+        <p:sp>
+          <p:nvSpPr>
+            <p:cNvPr id="34" name="Rectangle 33">
+              <a:extLst>
+                <a:ext uri="{FF2B5EF4-FFF2-40B4-BE49-F238E27FC236}">
+                  <a16:creationId xmlns:a16="http://schemas.microsoft.com/office/drawing/2014/main" id="{66EB78C2-5EF4-466E-8E0E-71C22E22D5FC}"/>
+                </a:ext>
+              </a:extLst>
+            </p:cNvPr>
+            <p:cNvSpPr/>
+            <p:nvPr/>
+          </p:nvSpPr>
+          <p:spPr>
+            <a:xfrm>
+              <a:off x="5090622" y="5817148"/>
+              <a:ext cx="1264051" cy="400678"/>
+            </a:xfrm>
+            <a:prstGeom prst="rect">
+              <a:avLst/>
+            </a:prstGeom>
+            <a:solidFill>
+              <a:srgbClr val="92D050"/>
+            </a:solidFill>
+            <a:ln>
+              <a:solidFill>
+                <a:schemeClr val="bg1">
+                  <a:lumMod val="65000"/>
+                </a:schemeClr>
+              </a:solidFill>
+            </a:ln>
+          </p:spPr>
+          <p:style>
+            <a:lnRef idx="2">
+              <a:schemeClr val="accent1">
+                <a:shade val="50000"/>
+              </a:schemeClr>
+            </a:lnRef>
+            <a:fillRef idx="1">
+              <a:schemeClr val="accent1"/>
+            </a:fillRef>
+            <a:effectRef idx="0">
+              <a:schemeClr val="accent1"/>
+            </a:effectRef>
+            <a:fontRef idx="minor">
+              <a:schemeClr val="lt1"/>
+            </a:fontRef>
+          </p:style>
+          <p:txBody>
+            <a:bodyPr rtlCol="0" anchor="ctr"/>
+            <a:lstStyle/>
+            <a:p>
+              <a:pPr algn="ctr"/>
+              <a:r>
+                <a:rPr lang="en-US" sz="1400" b="1" dirty="0">
+                  <a:latin typeface="Poppins Light" panose="00000400000000000000" pitchFamily="2" charset="0"/>
+                  <a:cs typeface="Poppins Light" panose="00000400000000000000" pitchFamily="2" charset="0"/>
+                </a:rPr>
+                <a:t>AOM</a:t>
+              </a:r>
+              <a:endParaRPr lang="LID4096" sz="1400" b="1" dirty="0">
+                <a:latin typeface="Poppins Light" panose="00000400000000000000" pitchFamily="2" charset="0"/>
+                <a:cs typeface="Poppins Light" panose="00000400000000000000" pitchFamily="2" charset="0"/>
+              </a:endParaRPr>
+            </a:p>
+          </p:txBody>
+        </p:sp>
+        <p:cxnSp>
+          <p:nvCxnSpPr>
+            <p:cNvPr id="35" name="Straight Connector 34">
+              <a:extLst>
+                <a:ext uri="{FF2B5EF4-FFF2-40B4-BE49-F238E27FC236}">
+                  <a16:creationId xmlns:a16="http://schemas.microsoft.com/office/drawing/2014/main" id="{E6D54720-7EC8-460F-BD28-A6A1ED8BCC84}"/>
+                </a:ext>
+              </a:extLst>
+            </p:cNvPr>
+            <p:cNvCxnSpPr>
+              <a:cxnSpLocks/>
+            </p:cNvCxnSpPr>
+            <p:nvPr/>
+          </p:nvCxnSpPr>
+          <p:spPr>
+            <a:xfrm flipH="1">
+              <a:off x="6375687" y="6003850"/>
+              <a:ext cx="998977" cy="13042"/>
+            </a:xfrm>
+            <a:prstGeom prst="line">
+              <a:avLst/>
+            </a:prstGeom>
+            <a:ln w="28575">
+              <a:solidFill>
+                <a:srgbClr val="92D050"/>
+              </a:solidFill>
+            </a:ln>
+          </p:spPr>
+          <p:style>
+            <a:lnRef idx="3">
+              <a:schemeClr val="accent1"/>
+            </a:lnRef>
+            <a:fillRef idx="0">
+              <a:schemeClr val="accent1"/>
+            </a:fillRef>
+            <a:effectRef idx="2">
+              <a:schemeClr val="accent1"/>
+            </a:effectRef>
+            <a:fontRef idx="minor">
+              <a:schemeClr val="tx1"/>
+            </a:fontRef>
+          </p:style>
+        </p:cxnSp>
+        <p:pic>
+          <p:nvPicPr>
+            <p:cNvPr id="37" name="Picture 36">
+              <a:extLst>
+                <a:ext uri="{FF2B5EF4-FFF2-40B4-BE49-F238E27FC236}">
+                  <a16:creationId xmlns:a16="http://schemas.microsoft.com/office/drawing/2014/main" id="{2901D58F-7B3F-4E25-A97F-E78EDD0E94BC}"/>
+                </a:ext>
+              </a:extLst>
+            </p:cNvPr>
+            <p:cNvPicPr>
+              <a:picLocks noChangeAspect="1"/>
+            </p:cNvPicPr>
+            <p:nvPr/>
+          </p:nvPicPr>
+          <p:blipFill>
+            <a:blip r:embed="rId7">
+              <a:extLst>
+                <a:ext uri="{BEBA8EAE-BF5A-486C-A8C5-ECC9F3942E4B}">
+                  <a14:imgProps xmlns:a14="http://schemas.microsoft.com/office/drawing/2010/main">
+                    <a14:imgLayer r:embed="rId8">
+                      <a14:imgEffect>
+                        <a14:backgroundRemoval t="10000" b="90000" l="10000" r="90000">
+                          <a14:foregroundMark x1="52083" y1="70833" x2="52083" y2="70833"/>
+                          <a14:foregroundMark x1="52083" y1="58333" x2="52083" y2="58333"/>
+                          <a14:foregroundMark x1="52083" y1="58333" x2="52083" y2="58333"/>
+                          <a14:backgroundMark x1="18750" y1="31250" x2="18750" y2="31250"/>
+                          <a14:backgroundMark x1="18750" y1="31250" x2="18750" y2="31250"/>
+                          <a14:backgroundMark x1="35417" y1="31250" x2="35417" y2="31250"/>
+                        </a14:backgroundRemoval>
+                      </a14:imgEffect>
+                    </a14:imgLayer>
+                  </a14:imgProps>
+                </a:ext>
+                <a:ext uri="{28A0092B-C50C-407E-A947-70E740481C1C}">
+                  <a14:useLocalDpi xmlns:a14="http://schemas.microsoft.com/office/drawing/2010/main" val="0"/>
+                </a:ext>
+              </a:extLst>
+            </a:blip>
+            <a:stretch>
+              <a:fillRect/>
+            </a:stretch>
+          </p:blipFill>
+          <p:spPr>
+            <a:xfrm rot="5400000">
+              <a:off x="9149685" y="5837394"/>
+              <a:ext cx="355088" cy="342444"/>
+            </a:xfrm>
+            <a:prstGeom prst="rect">
+              <a:avLst/>
+            </a:prstGeom>
+          </p:spPr>
+        </p:pic>
+        <p:sp>
+          <p:nvSpPr>
+            <p:cNvPr id="39" name="Isosceles Triangle 38">
+              <a:extLst>
+                <a:ext uri="{FF2B5EF4-FFF2-40B4-BE49-F238E27FC236}">
+                  <a16:creationId xmlns:a16="http://schemas.microsoft.com/office/drawing/2014/main" id="{85607F99-8DB6-4C90-A9C7-7CB0039DB765}"/>
+                </a:ext>
+              </a:extLst>
+            </p:cNvPr>
+            <p:cNvSpPr/>
+            <p:nvPr/>
+          </p:nvSpPr>
+          <p:spPr>
+            <a:xfrm rot="5400000">
+              <a:off x="7166162" y="5895670"/>
+              <a:ext cx="242517" cy="227999"/>
+            </a:xfrm>
+            <a:prstGeom prst="triangle">
+              <a:avLst/>
+            </a:prstGeom>
+            <a:solidFill>
+              <a:srgbClr val="92D050"/>
+            </a:solidFill>
+            <a:ln>
+              <a:noFill/>
+            </a:ln>
+          </p:spPr>
+          <p:style>
+            <a:lnRef idx="2">
+              <a:schemeClr val="accent1">
+                <a:shade val="50000"/>
+              </a:schemeClr>
+            </a:lnRef>
+            <a:fillRef idx="1">
+              <a:schemeClr val="accent1"/>
+            </a:fillRef>
+            <a:effectRef idx="0">
+              <a:schemeClr val="accent1"/>
+            </a:effectRef>
+            <a:fontRef idx="minor">
+              <a:schemeClr val="lt1"/>
+            </a:fontRef>
+          </p:style>
+          <p:txBody>
+            <a:bodyPr rtlCol="0" anchor="ctr"/>
+            <a:lstStyle/>
+            <a:p>
+              <a:pPr algn="ctr"/>
+              <a:endParaRPr lang="en-US"/>
+            </a:p>
+          </p:txBody>
+        </p:sp>
+        <p:cxnSp>
+          <p:nvCxnSpPr>
+            <p:cNvPr id="40" name="Straight Connector 39">
+              <a:extLst>
+                <a:ext uri="{FF2B5EF4-FFF2-40B4-BE49-F238E27FC236}">
+                  <a16:creationId xmlns:a16="http://schemas.microsoft.com/office/drawing/2014/main" id="{5011CD25-20FA-46F6-8D75-506C758ADBA1}"/>
+                </a:ext>
+              </a:extLst>
+            </p:cNvPr>
+            <p:cNvCxnSpPr>
+              <a:cxnSpLocks/>
+            </p:cNvCxnSpPr>
+            <p:nvPr/>
+          </p:nvCxnSpPr>
+          <p:spPr>
+            <a:xfrm>
+              <a:off x="7979371" y="2446726"/>
+              <a:ext cx="0" cy="899462"/>
+            </a:xfrm>
+            <a:prstGeom prst="line">
+              <a:avLst/>
+            </a:prstGeom>
+          </p:spPr>
+          <p:style>
+            <a:lnRef idx="3">
+              <a:schemeClr val="accent1"/>
+            </a:lnRef>
+            <a:fillRef idx="0">
+              <a:schemeClr val="accent1"/>
+            </a:fillRef>
+            <a:effectRef idx="2">
+              <a:schemeClr val="accent1"/>
+            </a:effectRef>
+            <a:fontRef idx="minor">
+              <a:schemeClr val="tx1"/>
+            </a:fontRef>
+          </p:style>
+        </p:cxnSp>
+        <p:cxnSp>
+          <p:nvCxnSpPr>
+            <p:cNvPr id="41" name="Straight Connector 40">
+              <a:extLst>
+                <a:ext uri="{FF2B5EF4-FFF2-40B4-BE49-F238E27FC236}">
+                  <a16:creationId xmlns:a16="http://schemas.microsoft.com/office/drawing/2014/main" id="{D6E34E93-DC49-4DE7-B5A6-E15CB053843C}"/>
+                </a:ext>
+              </a:extLst>
+            </p:cNvPr>
+            <p:cNvCxnSpPr>
+              <a:cxnSpLocks/>
+            </p:cNvCxnSpPr>
+            <p:nvPr/>
+          </p:nvCxnSpPr>
+          <p:spPr>
+            <a:xfrm>
+              <a:off x="7891210" y="2425200"/>
+              <a:ext cx="91352" cy="30095"/>
+            </a:xfrm>
+            <a:prstGeom prst="line">
+              <a:avLst/>
+            </a:prstGeom>
+          </p:spPr>
+          <p:style>
+            <a:lnRef idx="3">
+              <a:schemeClr val="accent1"/>
+            </a:lnRef>
+            <a:fillRef idx="0">
+              <a:schemeClr val="accent1"/>
+            </a:fillRef>
+            <a:effectRef idx="2">
+              <a:schemeClr val="accent1"/>
+            </a:effectRef>
+            <a:fontRef idx="minor">
+              <a:schemeClr val="tx1"/>
+            </a:fontRef>
+          </p:style>
+        </p:cxnSp>
+        <p:cxnSp>
+          <p:nvCxnSpPr>
+            <p:cNvPr id="42" name="Straight Connector 41">
+              <a:extLst>
+                <a:ext uri="{FF2B5EF4-FFF2-40B4-BE49-F238E27FC236}">
+                  <a16:creationId xmlns:a16="http://schemas.microsoft.com/office/drawing/2014/main" id="{09219500-F0FE-494C-987D-17B29C826E30}"/>
+                </a:ext>
+              </a:extLst>
+            </p:cNvPr>
+            <p:cNvCxnSpPr>
+              <a:cxnSpLocks/>
+            </p:cNvCxnSpPr>
+            <p:nvPr/>
+          </p:nvCxnSpPr>
+          <p:spPr>
+            <a:xfrm flipV="1">
+              <a:off x="5722647" y="3335173"/>
+              <a:ext cx="2256724" cy="11015"/>
+            </a:xfrm>
+            <a:prstGeom prst="line">
+              <a:avLst/>
+            </a:prstGeom>
+          </p:spPr>
+          <p:style>
+            <a:lnRef idx="3">
+              <a:schemeClr val="accent1"/>
+            </a:lnRef>
+            <a:fillRef idx="0">
+              <a:schemeClr val="accent1"/>
+            </a:fillRef>
+            <a:effectRef idx="2">
+              <a:schemeClr val="accent1"/>
+            </a:effectRef>
+            <a:fontRef idx="minor">
+              <a:schemeClr val="tx1"/>
+            </a:fontRef>
+          </p:style>
+        </p:cxnSp>
+        <p:cxnSp>
+          <p:nvCxnSpPr>
+            <p:cNvPr id="43" name="Straight Connector 42">
+              <a:extLst>
+                <a:ext uri="{FF2B5EF4-FFF2-40B4-BE49-F238E27FC236}">
+                  <a16:creationId xmlns:a16="http://schemas.microsoft.com/office/drawing/2014/main" id="{44C0A0B8-413F-4AA6-9882-A60F8DF53866}"/>
+                </a:ext>
+              </a:extLst>
+            </p:cNvPr>
+            <p:cNvCxnSpPr>
+              <a:cxnSpLocks/>
+              <a:endCxn id="34" idx="0"/>
+            </p:cNvCxnSpPr>
+            <p:nvPr/>
+          </p:nvCxnSpPr>
+          <p:spPr>
+            <a:xfrm flipH="1">
+              <a:off x="5722648" y="3335173"/>
+              <a:ext cx="1" cy="2481975"/>
+            </a:xfrm>
+            <a:prstGeom prst="line">
+              <a:avLst/>
+            </a:prstGeom>
+          </p:spPr>
+          <p:style>
+            <a:lnRef idx="3">
+              <a:schemeClr val="accent1"/>
+            </a:lnRef>
+            <a:fillRef idx="0">
+              <a:schemeClr val="accent1"/>
+            </a:fillRef>
+            <a:effectRef idx="2">
+              <a:schemeClr val="accent1"/>
+            </a:effectRef>
+            <a:fontRef idx="minor">
+              <a:schemeClr val="tx1"/>
+            </a:fontRef>
+          </p:style>
+        </p:cxnSp>
+        <p:pic>
+          <p:nvPicPr>
+            <p:cNvPr id="44" name="Picture 43">
+              <a:extLst>
+                <a:ext uri="{FF2B5EF4-FFF2-40B4-BE49-F238E27FC236}">
+                  <a16:creationId xmlns:a16="http://schemas.microsoft.com/office/drawing/2014/main" id="{7BF6C0BC-DB01-45CD-A7E8-255C052CD694}"/>
+                </a:ext>
+              </a:extLst>
+            </p:cNvPr>
+            <p:cNvPicPr>
+              <a:picLocks noChangeAspect="1"/>
+            </p:cNvPicPr>
+            <p:nvPr/>
+          </p:nvPicPr>
+          <p:blipFill rotWithShape="1">
+            <a:blip r:embed="rId5">
+              <a:extLst>
+                <a:ext uri="{BEBA8EAE-BF5A-486C-A8C5-ECC9F3942E4B}">
+                  <a14:imgProps xmlns:a14="http://schemas.microsoft.com/office/drawing/2010/main">
+                    <a14:imgLayer r:embed="rId6">
+                      <a14:imgEffect>
+                        <a14:backgroundRemoval t="18534" b="76868" l="20984" r="77311"/>
+                      </a14:imgEffect>
+                    </a14:imgLayer>
+                  </a14:imgProps>
+                </a:ext>
+                <a:ext uri="{28A0092B-C50C-407E-A947-70E740481C1C}">
+                  <a14:useLocalDpi xmlns:a14="http://schemas.microsoft.com/office/drawing/2010/main" val="0"/>
+                </a:ext>
+              </a:extLst>
+            </a:blip>
+            <a:srcRect l="13944" t="11242" r="15647" b="15840"/>
+            <a:stretch/>
+          </p:blipFill>
+          <p:spPr>
+            <a:xfrm rot="16200000">
+              <a:off x="5659909" y="5690251"/>
+              <a:ext cx="137456" cy="137286"/>
+            </a:xfrm>
+            <a:prstGeom prst="rect">
+              <a:avLst/>
+            </a:prstGeom>
+          </p:spPr>
+        </p:pic>
+        <p:sp>
+          <p:nvSpPr>
+            <p:cNvPr id="45" name="TextBox 44">
+              <a:extLst>
+                <a:ext uri="{FF2B5EF4-FFF2-40B4-BE49-F238E27FC236}">
+                  <a16:creationId xmlns:a16="http://schemas.microsoft.com/office/drawing/2014/main" id="{A76A0BA9-C396-48B9-961C-F34C02A0B144}"/>
+                </a:ext>
+              </a:extLst>
+            </p:cNvPr>
+            <p:cNvSpPr txBox="1"/>
+            <p:nvPr/>
+          </p:nvSpPr>
+          <p:spPr>
+            <a:xfrm>
+              <a:off x="5641770" y="4386172"/>
+              <a:ext cx="615114" cy="415498"/>
+            </a:xfrm>
+            <a:prstGeom prst="rect">
+              <a:avLst/>
+            </a:prstGeom>
+            <a:noFill/>
+          </p:spPr>
+          <p:txBody>
+            <a:bodyPr wrap="square" rtlCol="0">
+              <a:spAutoFit/>
+            </a:bodyPr>
+            <a:lstStyle/>
+            <a:p>
+              <a:pPr algn="ctr"/>
+              <a:r>
+                <a:rPr lang="en-US" sz="1050" dirty="0">
+                  <a:solidFill>
+                    <a:schemeClr val="bg1"/>
+                  </a:solidFill>
+                  <a:latin typeface="Poppins Light" panose="00000400000000000000" pitchFamily="2" charset="0"/>
+                  <a:cs typeface="Poppins Light" panose="00000400000000000000" pitchFamily="2" charset="0"/>
+                </a:rPr>
+                <a:t>AOM RF</a:t>
+              </a:r>
+              <a:endParaRPr lang="LID4096" sz="1050" dirty="0">
+                <a:solidFill>
+                  <a:schemeClr val="bg1"/>
+                </a:solidFill>
+                <a:latin typeface="Poppins Light" panose="00000400000000000000" pitchFamily="2" charset="0"/>
+                <a:cs typeface="Poppins Light" panose="00000400000000000000" pitchFamily="2" charset="0"/>
+              </a:endParaRPr>
+            </a:p>
+          </p:txBody>
+        </p:sp>
+        <p:sp>
+          <p:nvSpPr>
+            <p:cNvPr id="46" name="TextBox 45">
+              <a:extLst>
+                <a:ext uri="{FF2B5EF4-FFF2-40B4-BE49-F238E27FC236}">
+                  <a16:creationId xmlns:a16="http://schemas.microsoft.com/office/drawing/2014/main" id="{B48A6377-4887-4E2D-968D-D086320CD13F}"/>
+                </a:ext>
+              </a:extLst>
+            </p:cNvPr>
+            <p:cNvSpPr txBox="1"/>
+            <p:nvPr/>
+          </p:nvSpPr>
+          <p:spPr>
+            <a:xfrm>
+              <a:off x="7559308" y="4345112"/>
+              <a:ext cx="615114" cy="215412"/>
+            </a:xfrm>
+            <a:prstGeom prst="rect">
+              <a:avLst/>
+            </a:prstGeom>
+            <a:noFill/>
+          </p:spPr>
+          <p:txBody>
+            <a:bodyPr wrap="square" rtlCol="0">
+              <a:spAutoFit/>
+            </a:bodyPr>
+            <a:lstStyle/>
+            <a:p>
+              <a:pPr algn="ctr"/>
+              <a:r>
+                <a:rPr lang="en-US" sz="1050" dirty="0">
+                  <a:solidFill>
+                    <a:schemeClr val="bg1"/>
+                  </a:solidFill>
+                  <a:latin typeface="Poppins Light" panose="00000400000000000000" pitchFamily="2" charset="0"/>
+                  <a:cs typeface="Poppins Light" panose="00000400000000000000" pitchFamily="2" charset="0"/>
+                </a:rPr>
+                <a:t>MW</a:t>
+              </a:r>
+              <a:endParaRPr lang="LID4096" sz="1050" dirty="0">
+                <a:solidFill>
+                  <a:schemeClr val="bg1"/>
+                </a:solidFill>
+                <a:latin typeface="Poppins Light" panose="00000400000000000000" pitchFamily="2" charset="0"/>
+                <a:cs typeface="Poppins Light" panose="00000400000000000000" pitchFamily="2" charset="0"/>
+              </a:endParaRPr>
+            </a:p>
+          </p:txBody>
+        </p:sp>
+        <p:sp>
+          <p:nvSpPr>
+            <p:cNvPr id="47" name="Isosceles Triangle 46">
+              <a:extLst>
+                <a:ext uri="{FF2B5EF4-FFF2-40B4-BE49-F238E27FC236}">
+                  <a16:creationId xmlns:a16="http://schemas.microsoft.com/office/drawing/2014/main" id="{F92750CB-D06C-4B31-8C65-4978422CBDCF}"/>
+                </a:ext>
+              </a:extLst>
+            </p:cNvPr>
+            <p:cNvSpPr/>
+            <p:nvPr/>
+          </p:nvSpPr>
+          <p:spPr>
+            <a:xfrm rot="10800000">
+              <a:off x="7645268" y="4907521"/>
+              <a:ext cx="133191" cy="155442"/>
+            </a:xfrm>
+            <a:prstGeom prst="triangle">
+              <a:avLst/>
+            </a:prstGeom>
+            <a:solidFill>
+              <a:srgbClr val="28292C"/>
+            </a:solidFill>
+            <a:ln>
+              <a:solidFill>
+                <a:srgbClr val="ABABAD"/>
+              </a:solidFill>
+            </a:ln>
+          </p:spPr>
+          <p:style>
+            <a:lnRef idx="2">
+              <a:schemeClr val="accent1">
+                <a:shade val="50000"/>
+              </a:schemeClr>
+            </a:lnRef>
+            <a:fillRef idx="1">
+              <a:schemeClr val="accent1"/>
+            </a:fillRef>
+            <a:effectRef idx="0">
+              <a:schemeClr val="accent1"/>
+            </a:effectRef>
+            <a:fontRef idx="minor">
+              <a:schemeClr val="lt1"/>
+            </a:fontRef>
+          </p:style>
+          <p:txBody>
+            <a:bodyPr rtlCol="0" anchor="ctr"/>
+            <a:lstStyle/>
+            <a:p>
+              <a:pPr algn="ctr"/>
+              <a:endParaRPr lang="en-IL"/>
+            </a:p>
+          </p:txBody>
+        </p:sp>
+        <p:sp>
+          <p:nvSpPr>
+            <p:cNvPr id="56" name="TextBox 55">
+              <a:extLst>
+                <a:ext uri="{FF2B5EF4-FFF2-40B4-BE49-F238E27FC236}">
+                  <a16:creationId xmlns:a16="http://schemas.microsoft.com/office/drawing/2014/main" id="{04E72FB4-A636-4444-B1C0-D4F045041987}"/>
+                </a:ext>
+              </a:extLst>
+            </p:cNvPr>
+            <p:cNvSpPr txBox="1"/>
+            <p:nvPr/>
+          </p:nvSpPr>
+          <p:spPr>
+            <a:xfrm rot="16200000">
+              <a:off x="5134946" y="4883007"/>
+              <a:ext cx="824793" cy="188855"/>
+            </a:xfrm>
+            <a:prstGeom prst="rect">
+              <a:avLst/>
+            </a:prstGeom>
+            <a:noFill/>
+          </p:spPr>
+          <p:txBody>
+            <a:bodyPr wrap="square" rtlCol="0">
+              <a:spAutoFit/>
+            </a:bodyPr>
+            <a:lstStyle/>
+            <a:p>
+              <a:pPr algn="ctr"/>
+              <a:r>
+                <a:rPr lang="en-US" sz="900" dirty="0">
+                  <a:solidFill>
+                    <a:schemeClr val="bg1"/>
+                  </a:solidFill>
+                  <a:latin typeface="Poppins Light" panose="00000400000000000000" pitchFamily="2" charset="0"/>
+                  <a:cs typeface="Poppins Light" panose="00000400000000000000" pitchFamily="2" charset="0"/>
+                </a:rPr>
+                <a:t>AMP</a:t>
+              </a:r>
+              <a:endParaRPr lang="LID4096" sz="900" dirty="0">
+                <a:solidFill>
+                  <a:schemeClr val="bg1"/>
+                </a:solidFill>
+                <a:latin typeface="Poppins Light" panose="00000400000000000000" pitchFamily="2" charset="0"/>
+                <a:cs typeface="Poppins Light" panose="00000400000000000000" pitchFamily="2" charset="0"/>
+              </a:endParaRPr>
+            </a:p>
+          </p:txBody>
+        </p:sp>
+        <p:sp>
+          <p:nvSpPr>
+            <p:cNvPr id="57" name="Isosceles Triangle 56">
+              <a:extLst>
+                <a:ext uri="{FF2B5EF4-FFF2-40B4-BE49-F238E27FC236}">
+                  <a16:creationId xmlns:a16="http://schemas.microsoft.com/office/drawing/2014/main" id="{F8525ACF-08CB-411D-B742-F37ACE3E9F9C}"/>
+                </a:ext>
+              </a:extLst>
+            </p:cNvPr>
+            <p:cNvSpPr/>
+            <p:nvPr/>
+          </p:nvSpPr>
+          <p:spPr>
+            <a:xfrm rot="10800000">
+              <a:off x="5654924" y="4907521"/>
+              <a:ext cx="133191" cy="155442"/>
+            </a:xfrm>
+            <a:prstGeom prst="triangle">
+              <a:avLst/>
+            </a:prstGeom>
+            <a:solidFill>
+              <a:srgbClr val="28292C"/>
+            </a:solidFill>
+            <a:ln>
+              <a:solidFill>
+                <a:srgbClr val="ABABAD"/>
+              </a:solidFill>
+            </a:ln>
+          </p:spPr>
+          <p:style>
+            <a:lnRef idx="2">
+              <a:schemeClr val="accent1">
+                <a:shade val="50000"/>
+              </a:schemeClr>
+            </a:lnRef>
+            <a:fillRef idx="1">
+              <a:schemeClr val="accent1"/>
+            </a:fillRef>
+            <a:effectRef idx="0">
+              <a:schemeClr val="accent1"/>
+            </a:effectRef>
+            <a:fontRef idx="minor">
+              <a:schemeClr val="lt1"/>
+            </a:fontRef>
+          </p:style>
+          <p:txBody>
+            <a:bodyPr rtlCol="0" anchor="ctr"/>
+            <a:lstStyle/>
+            <a:p>
+              <a:pPr algn="ctr"/>
+              <a:endParaRPr lang="en-IL"/>
+            </a:p>
+          </p:txBody>
+        </p:sp>
+        <p:sp>
+          <p:nvSpPr>
+            <p:cNvPr id="58" name="Rectangle 57">
+              <a:extLst>
+                <a:ext uri="{FF2B5EF4-FFF2-40B4-BE49-F238E27FC236}">
+                  <a16:creationId xmlns:a16="http://schemas.microsoft.com/office/drawing/2014/main" id="{FF30872F-B84B-4035-A7BD-DC9DCDC90730}"/>
+                </a:ext>
+              </a:extLst>
+            </p:cNvPr>
+            <p:cNvSpPr/>
+            <p:nvPr/>
+          </p:nvSpPr>
+          <p:spPr>
+            <a:xfrm>
+              <a:off x="2735938" y="5817148"/>
+              <a:ext cx="1264051" cy="400678"/>
+            </a:xfrm>
+            <a:prstGeom prst="rect">
+              <a:avLst/>
+            </a:prstGeom>
+            <a:solidFill>
+              <a:srgbClr val="92D050"/>
+            </a:solidFill>
+            <a:ln>
+              <a:solidFill>
+                <a:schemeClr val="bg1">
+                  <a:lumMod val="65000"/>
+                </a:schemeClr>
+              </a:solidFill>
+            </a:ln>
+          </p:spPr>
+          <p:style>
+            <a:lnRef idx="2">
+              <a:schemeClr val="accent1">
+                <a:shade val="50000"/>
+              </a:schemeClr>
+            </a:lnRef>
+            <a:fillRef idx="1">
+              <a:schemeClr val="accent1"/>
+            </a:fillRef>
+            <a:effectRef idx="0">
+              <a:schemeClr val="accent1"/>
+            </a:effectRef>
+            <a:fontRef idx="minor">
+              <a:schemeClr val="lt1"/>
+            </a:fontRef>
+          </p:style>
+          <p:txBody>
+            <a:bodyPr rtlCol="0" anchor="ctr"/>
+            <a:lstStyle/>
+            <a:p>
+              <a:pPr algn="ctr"/>
+              <a:r>
+                <a:rPr lang="en-US" sz="1400" b="1" dirty="0">
+                  <a:latin typeface="Poppins Light" panose="00000400000000000000" pitchFamily="2" charset="0"/>
+                  <a:cs typeface="Poppins Light" panose="00000400000000000000" pitchFamily="2" charset="0"/>
+                </a:rPr>
+                <a:t>Laser</a:t>
+              </a:r>
+              <a:endParaRPr lang="LID4096" sz="1400" b="1" dirty="0">
+                <a:latin typeface="Poppins Light" panose="00000400000000000000" pitchFamily="2" charset="0"/>
+                <a:cs typeface="Poppins Light" panose="00000400000000000000" pitchFamily="2" charset="0"/>
+              </a:endParaRPr>
+            </a:p>
+          </p:txBody>
+        </p:sp>
+        <p:cxnSp>
+          <p:nvCxnSpPr>
+            <p:cNvPr id="60" name="Straight Connector 59">
+              <a:extLst>
+                <a:ext uri="{FF2B5EF4-FFF2-40B4-BE49-F238E27FC236}">
+                  <a16:creationId xmlns:a16="http://schemas.microsoft.com/office/drawing/2014/main" id="{9864CA88-7789-4F6E-81F6-F90DCD7A0916}"/>
+                </a:ext>
+              </a:extLst>
+            </p:cNvPr>
+            <p:cNvCxnSpPr>
+              <a:cxnSpLocks/>
+              <a:endCxn id="58" idx="3"/>
+            </p:cNvCxnSpPr>
+            <p:nvPr/>
+          </p:nvCxnSpPr>
+          <p:spPr>
+            <a:xfrm flipH="1">
+              <a:off x="3999989" y="6010398"/>
+              <a:ext cx="1057038" cy="7089"/>
+            </a:xfrm>
+            <a:prstGeom prst="line">
+              <a:avLst/>
+            </a:prstGeom>
+            <a:ln w="28575">
+              <a:solidFill>
+                <a:srgbClr val="92D050"/>
+              </a:solidFill>
+            </a:ln>
+          </p:spPr>
+          <p:style>
+            <a:lnRef idx="3">
+              <a:schemeClr val="accent1"/>
+            </a:lnRef>
+            <a:fillRef idx="0">
+              <a:schemeClr val="accent1"/>
+            </a:fillRef>
+            <a:effectRef idx="2">
+              <a:schemeClr val="accent1"/>
+            </a:effectRef>
+            <a:fontRef idx="minor">
+              <a:schemeClr val="tx1"/>
+            </a:fontRef>
+          </p:style>
+        </p:cxnSp>
+        <p:sp>
+          <p:nvSpPr>
+            <p:cNvPr id="61" name="Isosceles Triangle 60">
+              <a:extLst>
+                <a:ext uri="{FF2B5EF4-FFF2-40B4-BE49-F238E27FC236}">
+                  <a16:creationId xmlns:a16="http://schemas.microsoft.com/office/drawing/2014/main" id="{9A59D2C6-EE74-4FAD-9AAF-FC4F52B09788}"/>
+                </a:ext>
+              </a:extLst>
+            </p:cNvPr>
+            <p:cNvSpPr/>
+            <p:nvPr/>
+          </p:nvSpPr>
+          <p:spPr>
+            <a:xfrm rot="5400000">
+              <a:off x="4848524" y="5902218"/>
+              <a:ext cx="242517" cy="227999"/>
+            </a:xfrm>
+            <a:prstGeom prst="triangle">
+              <a:avLst/>
+            </a:prstGeom>
+            <a:solidFill>
+              <a:srgbClr val="92D050"/>
+            </a:solidFill>
+            <a:ln>
+              <a:noFill/>
+            </a:ln>
+          </p:spPr>
+          <p:style>
+            <a:lnRef idx="2">
+              <a:schemeClr val="accent1">
+                <a:shade val="50000"/>
+              </a:schemeClr>
+            </a:lnRef>
+            <a:fillRef idx="1">
+              <a:schemeClr val="accent1"/>
+            </a:fillRef>
+            <a:effectRef idx="0">
+              <a:schemeClr val="accent1"/>
+            </a:effectRef>
+            <a:fontRef idx="minor">
+              <a:schemeClr val="lt1"/>
+            </a:fontRef>
+          </p:style>
+          <p:txBody>
+            <a:bodyPr rtlCol="0" anchor="ctr"/>
+            <a:lstStyle/>
+            <a:p>
+              <a:pPr algn="ctr"/>
+              <a:endParaRPr lang="en-US"/>
+            </a:p>
+          </p:txBody>
+        </p:sp>
+      </p:grpSp>
+      <p:sp>
+        <p:nvSpPr>
+          <p:cNvPr id="55" name="Content Placeholder 2">
+            <a:extLst>
+              <a:ext uri="{FF2B5EF4-FFF2-40B4-BE49-F238E27FC236}">
+                <a16:creationId xmlns:a16="http://schemas.microsoft.com/office/drawing/2014/main" id="{5F767C1E-D8A5-4A16-8746-94D757EBDB2F}"/>
+              </a:ext>
+            </a:extLst>
+          </p:cNvPr>
+          <p:cNvSpPr>
+            <a:spLocks noGrp="1"/>
+          </p:cNvSpPr>
+          <p:nvPr>
+            <p:ph idx="1"/>
+          </p:nvPr>
+        </p:nvSpPr>
+        <p:spPr>
+          <a:xfrm>
+            <a:off x="645253" y="2102462"/>
+            <a:ext cx="5449824" cy="4351338"/>
+          </a:xfrm>
+        </p:spPr>
+        <p:txBody>
+          <a:bodyPr/>
+          <a:lstStyle/>
+          <a:p>
+            <a:endParaRPr lang="en-US" dirty="0"/>
+          </a:p>
+          <a:p>
+            <a:endParaRPr lang="en-US" dirty="0"/>
+          </a:p>
+        </p:txBody>
+      </p:sp>
+      <p:pic>
+        <p:nvPicPr>
+          <p:cNvPr id="2050" name="Picture 2" descr="Ultraprecise Microscopy Stages">
+            <a:extLst>
+              <a:ext uri="{FF2B5EF4-FFF2-40B4-BE49-F238E27FC236}">
+                <a16:creationId xmlns:a16="http://schemas.microsoft.com/office/drawing/2014/main" id="{8F2F8AE8-2F63-410C-A33F-B1DD651EB014}"/>
+              </a:ext>
+            </a:extLst>
+          </p:cNvPr>
+          <p:cNvPicPr>
+            <a:picLocks noChangeAspect="1" noChangeArrowheads="1"/>
+          </p:cNvPicPr>
+          <p:nvPr/>
+        </p:nvPicPr>
+        <p:blipFill>
+          <a:blip r:embed="rId9">
+            <a:extLst>
+              <a:ext uri="{BEBA8EAE-BF5A-486C-A8C5-ECC9F3942E4B}">
+                <a14:imgProps xmlns:a14="http://schemas.microsoft.com/office/drawing/2010/main">
+                  <a14:imgLayer r:embed="rId10">
+                    <a14:imgEffect>
+                      <a14:backgroundRemoval t="10000" b="90000" l="10000" r="90000"/>
+                    </a14:imgEffect>
+                  </a14:imgLayer>
+                </a14:imgProps>
+              </a:ext>
+              <a:ext uri="{28A0092B-C50C-407E-A947-70E740481C1C}">
+                <a14:useLocalDpi xmlns:a14="http://schemas.microsoft.com/office/drawing/2010/main" val="0"/>
+              </a:ext>
+            </a:extLst>
+          </a:blip>
+          <a:srcRect/>
+          <a:stretch>
+            <a:fillRect/>
+          </a:stretch>
+        </p:blipFill>
+        <p:spPr bwMode="auto">
+          <a:xfrm>
+            <a:off x="6490549" y="5886614"/>
+            <a:ext cx="1472002" cy="963811"/>
+          </a:xfrm>
+          <a:prstGeom prst="rect">
+            <a:avLst/>
+          </a:prstGeom>
+          <a:noFill/>
+          <a:extLst>
+            <a:ext uri="{909E8E84-426E-40DD-AFC4-6F175D3DCCD1}">
+              <a14:hiddenFill xmlns:a14="http://schemas.microsoft.com/office/drawing/2010/main">
+                <a:solidFill>
+                  <a:srgbClr val="FFFFFF"/>
+                </a:solidFill>
+              </a14:hiddenFill>
+            </a:ext>
+          </a:extLst>
+        </p:spPr>
+      </p:pic>
+      <p:pic>
+        <p:nvPicPr>
+          <p:cNvPr id="59" name="Picture 58">
+            <a:extLst>
+              <a:ext uri="{FF2B5EF4-FFF2-40B4-BE49-F238E27FC236}">
+                <a16:creationId xmlns:a16="http://schemas.microsoft.com/office/drawing/2014/main" id="{408DF7C0-4D65-4C8C-8B77-B14215CEF325}"/>
+              </a:ext>
+            </a:extLst>
+          </p:cNvPr>
+          <p:cNvPicPr>
+            <a:picLocks noChangeAspect="1"/>
+          </p:cNvPicPr>
+          <p:nvPr/>
+        </p:nvPicPr>
+        <p:blipFill>
+          <a:blip r:embed="rId11">
+            <a:extLst>
+              <a:ext uri="{28A0092B-C50C-407E-A947-70E740481C1C}">
+                <a14:useLocalDpi xmlns:a14="http://schemas.microsoft.com/office/drawing/2010/main" val="0"/>
+              </a:ext>
+            </a:extLst>
+          </a:blip>
+          <a:stretch>
+            <a:fillRect/>
+          </a:stretch>
+        </p:blipFill>
+        <p:spPr>
+          <a:xfrm>
+            <a:off x="6565715" y="4092407"/>
+            <a:ext cx="276098" cy="159049"/>
+          </a:xfrm>
+          <a:prstGeom prst="rect">
+            <a:avLst/>
+          </a:prstGeom>
+        </p:spPr>
+      </p:pic>
+      <p:sp>
+        <p:nvSpPr>
+          <p:cNvPr id="62" name="Rectangle 61">
+            <a:extLst>
+              <a:ext uri="{FF2B5EF4-FFF2-40B4-BE49-F238E27FC236}">
+                <a16:creationId xmlns:a16="http://schemas.microsoft.com/office/drawing/2014/main" id="{5F2F99D3-E1F5-467F-BFCB-F1C4ADA5D801}"/>
+              </a:ext>
+            </a:extLst>
+          </p:cNvPr>
+          <p:cNvSpPr/>
+          <p:nvPr/>
+        </p:nvSpPr>
+        <p:spPr>
+          <a:xfrm>
+            <a:off x="5988691" y="4055378"/>
+            <a:ext cx="518273" cy="258725"/>
+          </a:xfrm>
+          <a:prstGeom prst="rect">
+            <a:avLst/>
+          </a:prstGeom>
+          <a:solidFill>
+            <a:srgbClr val="8D83FF"/>
+          </a:solidFill>
+          <a:ln>
+            <a:solidFill>
+              <a:schemeClr val="bg1">
+                <a:lumMod val="65000"/>
+              </a:schemeClr>
+            </a:solidFill>
+          </a:ln>
+        </p:spPr>
+        <p:style>
+          <a:lnRef idx="2">
+            <a:schemeClr val="accent1">
+              <a:shade val="50000"/>
+            </a:schemeClr>
+          </a:lnRef>
+          <a:fillRef idx="1">
+            <a:schemeClr val="accent1"/>
+          </a:fillRef>
+          <a:effectRef idx="0">
+            <a:schemeClr val="accent1"/>
+          </a:effectRef>
+          <a:fontRef idx="minor">
+            <a:schemeClr val="lt1"/>
+          </a:fontRef>
+        </p:style>
+        <p:txBody>
+          <a:bodyPr rtlCol="0" anchor="ctr"/>
+          <a:lstStyle/>
+          <a:p>
+            <a:pPr algn="ctr"/>
+            <a:r>
+              <a:rPr lang="en-US" sz="1200" dirty="0">
+                <a:latin typeface="Poppins Light" panose="00000400000000000000" pitchFamily="2" charset="0"/>
+                <a:cs typeface="Poppins Light" panose="00000400000000000000" pitchFamily="2" charset="0"/>
+              </a:rPr>
+              <a:t>LO</a:t>
+            </a:r>
+            <a:r>
+              <a:rPr lang="en-US" sz="900" dirty="0">
+                <a:latin typeface="Poppins Light" panose="00000400000000000000" pitchFamily="2" charset="0"/>
+                <a:cs typeface="Poppins Light" panose="00000400000000000000" pitchFamily="2" charset="0"/>
+              </a:rPr>
+              <a:t> </a:t>
+            </a:r>
+          </a:p>
+        </p:txBody>
+      </p:sp>
+      <p:cxnSp>
+        <p:nvCxnSpPr>
+          <p:cNvPr id="63" name="Straight Arrow Connector 62">
+            <a:extLst>
+              <a:ext uri="{FF2B5EF4-FFF2-40B4-BE49-F238E27FC236}">
+                <a16:creationId xmlns:a16="http://schemas.microsoft.com/office/drawing/2014/main" id="{C9335C70-6E56-44D6-830B-E7AC98038246}"/>
+              </a:ext>
+            </a:extLst>
+          </p:cNvPr>
+          <p:cNvCxnSpPr>
+            <a:cxnSpLocks/>
+          </p:cNvCxnSpPr>
+          <p:nvPr/>
+        </p:nvCxnSpPr>
+        <p:spPr>
+          <a:xfrm>
+            <a:off x="6933607" y="6587143"/>
+            <a:ext cx="935253" cy="0"/>
+          </a:xfrm>
+          <a:prstGeom prst="straightConnector1">
+            <a:avLst/>
+          </a:prstGeom>
+          <a:ln w="12700">
+            <a:solidFill>
+              <a:srgbClr val="FFFF00"/>
+            </a:solidFill>
+            <a:tailEnd type="triangle"/>
+          </a:ln>
+        </p:spPr>
+        <p:style>
+          <a:lnRef idx="1">
+            <a:schemeClr val="accent1"/>
+          </a:lnRef>
+          <a:fillRef idx="0">
+            <a:schemeClr val="accent1"/>
+          </a:fillRef>
+          <a:effectRef idx="0">
+            <a:schemeClr val="accent1"/>
+          </a:effectRef>
+          <a:fontRef idx="minor">
+            <a:schemeClr val="tx1"/>
+          </a:fontRef>
+        </p:style>
+      </p:cxnSp>
+      <p:cxnSp>
+        <p:nvCxnSpPr>
+          <p:cNvPr id="64" name="Straight Arrow Connector 63">
+            <a:extLst>
+              <a:ext uri="{FF2B5EF4-FFF2-40B4-BE49-F238E27FC236}">
+                <a16:creationId xmlns:a16="http://schemas.microsoft.com/office/drawing/2014/main" id="{4400BC08-DB62-4A73-959D-F321BBB51B3D}"/>
+              </a:ext>
+            </a:extLst>
+          </p:cNvPr>
+          <p:cNvCxnSpPr>
+            <a:cxnSpLocks/>
+          </p:cNvCxnSpPr>
+          <p:nvPr/>
+        </p:nvCxnSpPr>
+        <p:spPr>
+          <a:xfrm flipH="1" flipV="1">
+            <a:off x="6761806" y="6357808"/>
+            <a:ext cx="181632" cy="226681"/>
+          </a:xfrm>
+          <a:prstGeom prst="straightConnector1">
+            <a:avLst/>
+          </a:prstGeom>
+          <a:ln w="12700">
+            <a:solidFill>
+              <a:srgbClr val="FFFF00"/>
+            </a:solidFill>
+            <a:tailEnd type="triangle"/>
+          </a:ln>
+        </p:spPr>
+        <p:style>
+          <a:lnRef idx="1">
+            <a:schemeClr val="accent1"/>
+          </a:lnRef>
+          <a:fillRef idx="0">
+            <a:schemeClr val="accent1"/>
+          </a:fillRef>
+          <a:effectRef idx="0">
+            <a:schemeClr val="accent1"/>
+          </a:effectRef>
+          <a:fontRef idx="minor">
+            <a:schemeClr val="tx1"/>
+          </a:fontRef>
+        </p:style>
+      </p:cxnSp>
+      <p:sp>
+        <p:nvSpPr>
+          <p:cNvPr id="49" name="TextBox 48">
+            <a:extLst>
+              <a:ext uri="{FF2B5EF4-FFF2-40B4-BE49-F238E27FC236}">
+                <a16:creationId xmlns:a16="http://schemas.microsoft.com/office/drawing/2014/main" id="{AD41016D-7659-4C23-AA99-186D374E37AF}"/>
+              </a:ext>
+            </a:extLst>
+          </p:cNvPr>
+          <p:cNvSpPr txBox="1"/>
+          <p:nvPr/>
+        </p:nvSpPr>
+        <p:spPr>
+          <a:xfrm>
+            <a:off x="7225624" y="6492875"/>
+            <a:ext cx="284052" cy="369332"/>
+          </a:xfrm>
+          <a:prstGeom prst="rect">
+            <a:avLst/>
+          </a:prstGeom>
+          <a:noFill/>
+        </p:spPr>
+        <p:txBody>
+          <a:bodyPr wrap="none" rtlCol="0">
+            <a:spAutoFit/>
+          </a:bodyPr>
+          <a:lstStyle/>
+          <a:p>
+            <a:r>
+              <a:rPr lang="en-US" dirty="0">
+                <a:solidFill>
+                  <a:srgbClr val="FFFF00"/>
+                </a:solidFill>
+              </a:rPr>
+              <a:t>x</a:t>
+            </a:r>
+            <a:endParaRPr lang="en-IL" dirty="0">
+              <a:solidFill>
+                <a:srgbClr val="FFFF00"/>
+              </a:solidFill>
+            </a:endParaRPr>
+          </a:p>
+        </p:txBody>
+      </p:sp>
+      <p:sp>
+        <p:nvSpPr>
+          <p:cNvPr id="65" name="TextBox 64">
+            <a:extLst>
+              <a:ext uri="{FF2B5EF4-FFF2-40B4-BE49-F238E27FC236}">
+                <a16:creationId xmlns:a16="http://schemas.microsoft.com/office/drawing/2014/main" id="{00A47A2D-F8AC-4F73-940A-44CE7502DBA6}"/>
+              </a:ext>
+            </a:extLst>
+          </p:cNvPr>
+          <p:cNvSpPr txBox="1"/>
+          <p:nvPr/>
+        </p:nvSpPr>
+        <p:spPr>
+          <a:xfrm>
+            <a:off x="6617375" y="6375500"/>
+            <a:ext cx="288862" cy="369332"/>
+          </a:xfrm>
+          <a:prstGeom prst="rect">
+            <a:avLst/>
+          </a:prstGeom>
+          <a:noFill/>
+        </p:spPr>
+        <p:txBody>
+          <a:bodyPr wrap="none" rtlCol="0">
+            <a:spAutoFit/>
+          </a:bodyPr>
+          <a:lstStyle/>
+          <a:p>
+            <a:r>
+              <a:rPr lang="en-US" dirty="0">
+                <a:solidFill>
+                  <a:srgbClr val="FFFF00"/>
+                </a:solidFill>
+              </a:rPr>
+              <a:t>y</a:t>
+            </a:r>
+            <a:endParaRPr lang="en-IL" dirty="0">
+              <a:solidFill>
+                <a:srgbClr val="FFFF00"/>
+              </a:solidFill>
+            </a:endParaRPr>
+          </a:p>
+        </p:txBody>
+      </p:sp>
+    </p:spTree>
+    <p:extLst>
+      <p:ext uri="{BB962C8B-B14F-4D97-AF65-F5344CB8AC3E}">
+        <p14:creationId xmlns:p14="http://schemas.microsoft.com/office/powerpoint/2010/main" val="1485663935"/>
+      </p:ext>
+    </p:extLst>
+  </p:cSld>
+  <p:clrMapOvr>
+    <a:masterClrMapping/>
+  </p:clrMapOvr>
+</p:sld>
+</file>
+
+<file path=ppt/slides/slide17.xml><?xml version="1.0" encoding="utf-8"?>
+<p:sld xmlns:a="http://schemas.openxmlformats.org/drawingml/2006/main" xmlns:r="http://schemas.openxmlformats.org/officeDocument/2006/relationships" xmlns:p="http://schemas.openxmlformats.org/presentationml/2006/main">
+  <p:cSld>
+    <p:spTree>
+      <p:nvGrpSpPr>
+        <p:cNvPr id="1" name=""/>
+        <p:cNvGrpSpPr/>
+        <p:nvPr/>
+      </p:nvGrpSpPr>
+      <p:grpSpPr>
+        <a:xfrm>
+          <a:off x="0" y="0"/>
+          <a:ext cx="0" cy="0"/>
+          <a:chOff x="0" y="0"/>
+          <a:chExt cx="0" cy="0"/>
+        </a:xfrm>
+      </p:grpSpPr>
+      <p:sp>
+        <p:nvSpPr>
+          <p:cNvPr id="2" name="Title 1">
+            <a:extLst>
+              <a:ext uri="{FF2B5EF4-FFF2-40B4-BE49-F238E27FC236}">
+                <a16:creationId xmlns:a16="http://schemas.microsoft.com/office/drawing/2014/main" id="{2DFAF9F6-109C-4FC7-B554-C21BCF8E4165}"/>
+              </a:ext>
+            </a:extLst>
+          </p:cNvPr>
+          <p:cNvSpPr>
+            <a:spLocks noGrp="1"/>
+          </p:cNvSpPr>
+          <p:nvPr>
+            <p:ph type="title"/>
+          </p:nvPr>
+        </p:nvSpPr>
+        <p:spPr/>
+        <p:txBody>
+          <a:bodyPr/>
+          <a:lstStyle/>
+          <a:p>
+            <a:r>
+              <a:rPr lang="en-US" dirty="0"/>
+              <a:t>G2 with a confocal setup</a:t>
+            </a:r>
+            <a:endParaRPr lang="en-IL" dirty="0"/>
+          </a:p>
+        </p:txBody>
+      </p:sp>
+      <p:grpSp>
+        <p:nvGrpSpPr>
+          <p:cNvPr id="5" name="Group 4">
+            <a:extLst>
+              <a:ext uri="{FF2B5EF4-FFF2-40B4-BE49-F238E27FC236}">
+                <a16:creationId xmlns:a16="http://schemas.microsoft.com/office/drawing/2014/main" id="{3F9A2E04-FBD1-4809-9E65-EA786EEC93DF}"/>
+              </a:ext>
+            </a:extLst>
+          </p:cNvPr>
+          <p:cNvGrpSpPr/>
+          <p:nvPr/>
+        </p:nvGrpSpPr>
+        <p:grpSpPr>
+          <a:xfrm>
+            <a:off x="2643623" y="1547459"/>
+            <a:ext cx="6628297" cy="4755529"/>
+            <a:chOff x="2735938" y="1140681"/>
+            <a:chExt cx="7313633" cy="5247229"/>
+          </a:xfrm>
+        </p:grpSpPr>
+        <p:pic>
+          <p:nvPicPr>
+            <p:cNvPr id="31" name="Picture 2" descr="Diamond NV Center Magnetometry | NIST">
+              <a:extLst>
+                <a:ext uri="{FF2B5EF4-FFF2-40B4-BE49-F238E27FC236}">
+                  <a16:creationId xmlns:a16="http://schemas.microsoft.com/office/drawing/2014/main" id="{AB9A6D07-CB9E-44A4-B8DC-C72075FF2C49}"/>
+                </a:ext>
+              </a:extLst>
+            </p:cNvPr>
+            <p:cNvPicPr>
+              <a:picLocks noChangeAspect="1" noChangeArrowheads="1"/>
+            </p:cNvPicPr>
+            <p:nvPr/>
+          </p:nvPicPr>
+          <p:blipFill>
+            <a:blip r:embed="rId2">
+              <a:extLst>
+                <a:ext uri="{28A0092B-C50C-407E-A947-70E740481C1C}">
+                  <a14:useLocalDpi xmlns:a14="http://schemas.microsoft.com/office/drawing/2010/main" val="0"/>
+                </a:ext>
+              </a:extLst>
+            </a:blip>
+            <a:srcRect/>
+            <a:stretch>
+              <a:fillRect/>
+            </a:stretch>
+          </p:blipFill>
+          <p:spPr bwMode="auto">
+            <a:xfrm>
+              <a:off x="7360655" y="5619789"/>
+              <a:ext cx="698440" cy="768121"/>
+            </a:xfrm>
+            <a:prstGeom prst="rect">
+              <a:avLst/>
+            </a:prstGeom>
+            <a:noFill/>
+            <a:extLst>
+              <a:ext uri="{909E8E84-426E-40DD-AFC4-6F175D3DCCD1}">
+                <a14:hiddenFill xmlns:a14="http://schemas.microsoft.com/office/drawing/2010/main">
+                  <a:solidFill>
+                    <a:srgbClr val="FFFFFF"/>
+                  </a:solidFill>
+                </a14:hiddenFill>
+              </a:ext>
+            </a:extLst>
+          </p:spPr>
+        </p:pic>
+        <p:pic>
+          <p:nvPicPr>
+            <p:cNvPr id="4" name="Picture 3">
+              <a:extLst>
+                <a:ext uri="{FF2B5EF4-FFF2-40B4-BE49-F238E27FC236}">
+                  <a16:creationId xmlns:a16="http://schemas.microsoft.com/office/drawing/2014/main" id="{757EF3BD-4730-49B9-B5ED-CC9ECB770D18}"/>
+                </a:ext>
+              </a:extLst>
+            </p:cNvPr>
+            <p:cNvPicPr>
+              <a:picLocks noChangeAspect="1"/>
+            </p:cNvPicPr>
+            <p:nvPr/>
+          </p:nvPicPr>
+          <p:blipFill>
+            <a:blip r:embed="rId3">
+              <a:extLst>
+                <a:ext uri="{28A0092B-C50C-407E-A947-70E740481C1C}">
+                  <a14:useLocalDpi xmlns:a14="http://schemas.microsoft.com/office/drawing/2010/main" val="0"/>
+                </a:ext>
+              </a:extLst>
+            </a:blip>
+            <a:stretch>
+              <a:fillRect/>
+            </a:stretch>
+          </p:blipFill>
+          <p:spPr>
+            <a:xfrm>
+              <a:off x="3409860" y="1140681"/>
+              <a:ext cx="5857454" cy="2765413"/>
+            </a:xfrm>
+            <a:prstGeom prst="rect">
+              <a:avLst/>
+            </a:prstGeom>
+          </p:spPr>
+        </p:pic>
+        <p:sp>
+          <p:nvSpPr>
+            <p:cNvPr id="6" name="Rectangle 5">
+              <a:extLst>
+                <a:ext uri="{FF2B5EF4-FFF2-40B4-BE49-F238E27FC236}">
+                  <a16:creationId xmlns:a16="http://schemas.microsoft.com/office/drawing/2014/main" id="{8DAFACE1-BBB7-4AAD-9984-B6A66F38AB76}"/>
+                </a:ext>
+              </a:extLst>
+            </p:cNvPr>
+            <p:cNvSpPr/>
+            <p:nvPr/>
+          </p:nvSpPr>
+          <p:spPr>
+            <a:xfrm>
+              <a:off x="7563388" y="3346188"/>
+              <a:ext cx="76155" cy="83022"/>
+            </a:xfrm>
+            <a:prstGeom prst="rect">
+              <a:avLst/>
+            </a:prstGeom>
+            <a:solidFill>
+              <a:srgbClr val="14171D"/>
+            </a:solidFill>
+            <a:ln>
+              <a:noFill/>
+            </a:ln>
+          </p:spPr>
+          <p:style>
+            <a:lnRef idx="2">
+              <a:schemeClr val="accent1">
+                <a:shade val="50000"/>
+              </a:schemeClr>
+            </a:lnRef>
+            <a:fillRef idx="1">
+              <a:schemeClr val="accent1"/>
+            </a:fillRef>
+            <a:effectRef idx="0">
+              <a:schemeClr val="accent1"/>
+            </a:effectRef>
+            <a:fontRef idx="minor">
+              <a:schemeClr val="lt1"/>
+            </a:fontRef>
+          </p:style>
+          <p:txBody>
+            <a:bodyPr rtlCol="0" anchor="ctr"/>
+            <a:lstStyle/>
+            <a:p>
+              <a:pPr algn="ctr"/>
+              <a:endParaRPr lang="LID4096" dirty="0"/>
+            </a:p>
+          </p:txBody>
+        </p:sp>
+        <p:cxnSp>
+          <p:nvCxnSpPr>
+            <p:cNvPr id="7" name="Straight Connector 6">
+              <a:extLst>
+                <a:ext uri="{FF2B5EF4-FFF2-40B4-BE49-F238E27FC236}">
+                  <a16:creationId xmlns:a16="http://schemas.microsoft.com/office/drawing/2014/main" id="{221DB41D-D9F9-4540-9BCC-55D481A49AE6}"/>
+                </a:ext>
+              </a:extLst>
+            </p:cNvPr>
+            <p:cNvCxnSpPr>
+              <a:cxnSpLocks/>
+            </p:cNvCxnSpPr>
+            <p:nvPr/>
+          </p:nvCxnSpPr>
+          <p:spPr>
+            <a:xfrm>
+              <a:off x="7510517" y="2482290"/>
+              <a:ext cx="91352" cy="30095"/>
+            </a:xfrm>
+            <a:prstGeom prst="line">
+              <a:avLst/>
+            </a:prstGeom>
+          </p:spPr>
+          <p:style>
+            <a:lnRef idx="3">
+              <a:schemeClr val="accent1"/>
+            </a:lnRef>
+            <a:fillRef idx="0">
+              <a:schemeClr val="accent1"/>
+            </a:fillRef>
+            <a:effectRef idx="2">
+              <a:schemeClr val="accent1"/>
+            </a:effectRef>
+            <a:fontRef idx="minor">
+              <a:schemeClr val="tx1"/>
+            </a:fontRef>
+          </p:style>
+        </p:cxnSp>
+        <p:cxnSp>
+          <p:nvCxnSpPr>
+            <p:cNvPr id="8" name="Straight Connector 7">
+              <a:extLst>
+                <a:ext uri="{FF2B5EF4-FFF2-40B4-BE49-F238E27FC236}">
+                  <a16:creationId xmlns:a16="http://schemas.microsoft.com/office/drawing/2014/main" id="{B1FE0BBC-7D27-46C8-B5C8-F0D85FBB13CF}"/>
+                </a:ext>
+              </a:extLst>
+            </p:cNvPr>
+            <p:cNvCxnSpPr>
+              <a:cxnSpLocks/>
+            </p:cNvCxnSpPr>
+            <p:nvPr/>
+          </p:nvCxnSpPr>
+          <p:spPr>
+            <a:xfrm>
+              <a:off x="7700345" y="2448945"/>
+              <a:ext cx="91352" cy="30095"/>
+            </a:xfrm>
+            <a:prstGeom prst="line">
+              <a:avLst/>
+            </a:prstGeom>
+          </p:spPr>
+          <p:style>
+            <a:lnRef idx="3">
+              <a:schemeClr val="accent1"/>
+            </a:lnRef>
+            <a:fillRef idx="0">
+              <a:schemeClr val="accent1"/>
+            </a:fillRef>
+            <a:effectRef idx="2">
+              <a:schemeClr val="accent1"/>
+            </a:effectRef>
+            <a:fontRef idx="minor">
+              <a:schemeClr val="tx1"/>
+            </a:fontRef>
+          </p:style>
+        </p:cxnSp>
+        <p:cxnSp>
+          <p:nvCxnSpPr>
+            <p:cNvPr id="9" name="Straight Connector 8">
+              <a:extLst>
+                <a:ext uri="{FF2B5EF4-FFF2-40B4-BE49-F238E27FC236}">
+                  <a16:creationId xmlns:a16="http://schemas.microsoft.com/office/drawing/2014/main" id="{0C061FC8-B509-4AE5-B66E-BBD79A4AF8BC}"/>
+                </a:ext>
+              </a:extLst>
+            </p:cNvPr>
+            <p:cNvCxnSpPr>
+              <a:cxnSpLocks/>
+            </p:cNvCxnSpPr>
+            <p:nvPr/>
+          </p:nvCxnSpPr>
+          <p:spPr>
+            <a:xfrm>
+              <a:off x="7602564" y="2506130"/>
+              <a:ext cx="0" cy="1293466"/>
+            </a:xfrm>
+            <a:prstGeom prst="line">
+              <a:avLst/>
+            </a:prstGeom>
+          </p:spPr>
+          <p:style>
+            <a:lnRef idx="3">
+              <a:schemeClr val="accent1"/>
+            </a:lnRef>
+            <a:fillRef idx="0">
+              <a:schemeClr val="accent1"/>
+            </a:fillRef>
+            <a:effectRef idx="2">
+              <a:schemeClr val="accent1"/>
+            </a:effectRef>
+            <a:fontRef idx="minor">
+              <a:schemeClr val="tx1"/>
+            </a:fontRef>
+          </p:style>
+        </p:cxnSp>
+        <p:cxnSp>
+          <p:nvCxnSpPr>
+            <p:cNvPr id="10" name="Straight Connector 9">
+              <a:extLst>
+                <a:ext uri="{FF2B5EF4-FFF2-40B4-BE49-F238E27FC236}">
+                  <a16:creationId xmlns:a16="http://schemas.microsoft.com/office/drawing/2014/main" id="{B5A1A1C3-F629-4685-BBC8-66D5A5047AA7}"/>
+                </a:ext>
+              </a:extLst>
+            </p:cNvPr>
+            <p:cNvCxnSpPr>
+              <a:cxnSpLocks/>
+            </p:cNvCxnSpPr>
+            <p:nvPr/>
+          </p:nvCxnSpPr>
+          <p:spPr>
+            <a:xfrm>
+              <a:off x="7792392" y="2472785"/>
+              <a:ext cx="0" cy="1326811"/>
+            </a:xfrm>
+            <a:prstGeom prst="line">
+              <a:avLst/>
+            </a:prstGeom>
+          </p:spPr>
+          <p:style>
+            <a:lnRef idx="3">
+              <a:schemeClr val="accent1"/>
+            </a:lnRef>
+            <a:fillRef idx="0">
+              <a:schemeClr val="accent1"/>
+            </a:fillRef>
+            <a:effectRef idx="2">
+              <a:schemeClr val="accent1"/>
+            </a:effectRef>
+            <a:fontRef idx="minor">
+              <a:schemeClr val="tx1"/>
+            </a:fontRef>
+          </p:style>
+        </p:cxnSp>
+        <p:pic>
+          <p:nvPicPr>
+            <p:cNvPr id="11" name="Picture 10">
+              <a:extLst>
+                <a:ext uri="{FF2B5EF4-FFF2-40B4-BE49-F238E27FC236}">
+                  <a16:creationId xmlns:a16="http://schemas.microsoft.com/office/drawing/2014/main" id="{A42757DE-D107-4B8C-8972-47A0F4353773}"/>
+                </a:ext>
+              </a:extLst>
+            </p:cNvPr>
+            <p:cNvPicPr>
+              <a:picLocks noChangeAspect="1"/>
+            </p:cNvPicPr>
+            <p:nvPr/>
+          </p:nvPicPr>
+          <p:blipFill rotWithShape="1">
+            <a:blip r:embed="rId4">
+              <a:extLst>
+                <a:ext uri="{28A0092B-C50C-407E-A947-70E740481C1C}">
+                  <a14:useLocalDpi xmlns:a14="http://schemas.microsoft.com/office/drawing/2010/main" val="0"/>
+                </a:ext>
+              </a:extLst>
+            </a:blip>
+            <a:srcRect/>
+            <a:stretch/>
+          </p:blipFill>
+          <p:spPr>
+            <a:xfrm>
+              <a:off x="7411713" y="3701808"/>
+              <a:ext cx="594817" cy="616779"/>
+            </a:xfrm>
+            <a:prstGeom prst="ellipse">
+              <a:avLst/>
+            </a:prstGeom>
+          </p:spPr>
+        </p:pic>
+        <p:pic>
+          <p:nvPicPr>
+            <p:cNvPr id="12" name="Picture 11">
+              <a:extLst>
+                <a:ext uri="{FF2B5EF4-FFF2-40B4-BE49-F238E27FC236}">
+                  <a16:creationId xmlns:a16="http://schemas.microsoft.com/office/drawing/2014/main" id="{EA0A25F7-F058-4DD8-8681-1AF0AB41C863}"/>
+                </a:ext>
+              </a:extLst>
+            </p:cNvPr>
+            <p:cNvPicPr>
+              <a:picLocks noChangeAspect="1"/>
+            </p:cNvPicPr>
+            <p:nvPr/>
+          </p:nvPicPr>
+          <p:blipFill rotWithShape="1">
+            <a:blip r:embed="rId5">
+              <a:extLst>
+                <a:ext uri="{BEBA8EAE-BF5A-486C-A8C5-ECC9F3942E4B}">
+                  <a14:imgProps xmlns:a14="http://schemas.microsoft.com/office/drawing/2010/main">
+                    <a14:imgLayer r:embed="rId6">
+                      <a14:imgEffect>
+                        <a14:backgroundRemoval t="18534" b="76868" l="20984" r="77311"/>
+                      </a14:imgEffect>
+                    </a14:imgLayer>
+                  </a14:imgProps>
+                </a:ext>
+                <a:ext uri="{28A0092B-C50C-407E-A947-70E740481C1C}">
+                  <a14:useLocalDpi xmlns:a14="http://schemas.microsoft.com/office/drawing/2010/main" val="0"/>
+                </a:ext>
+              </a:extLst>
+            </a:blip>
+            <a:srcRect l="13944" t="11242" r="15647" b="15840"/>
+            <a:stretch/>
+          </p:blipFill>
+          <p:spPr>
+            <a:xfrm rot="16200000">
+              <a:off x="7533829" y="3479751"/>
+              <a:ext cx="137456" cy="137286"/>
+            </a:xfrm>
+            <a:prstGeom prst="rect">
+              <a:avLst/>
+            </a:prstGeom>
+          </p:spPr>
+        </p:pic>
+        <p:pic>
+          <p:nvPicPr>
+            <p:cNvPr id="13" name="Picture 12">
+              <a:extLst>
+                <a:ext uri="{FF2B5EF4-FFF2-40B4-BE49-F238E27FC236}">
+                  <a16:creationId xmlns:a16="http://schemas.microsoft.com/office/drawing/2014/main" id="{17C0DE57-3044-4823-97C7-618082F11671}"/>
+                </a:ext>
+              </a:extLst>
+            </p:cNvPr>
+            <p:cNvPicPr>
+              <a:picLocks noChangeAspect="1"/>
+            </p:cNvPicPr>
+            <p:nvPr/>
+          </p:nvPicPr>
+          <p:blipFill rotWithShape="1">
+            <a:blip r:embed="rId5">
+              <a:extLst>
+                <a:ext uri="{BEBA8EAE-BF5A-486C-A8C5-ECC9F3942E4B}">
+                  <a14:imgProps xmlns:a14="http://schemas.microsoft.com/office/drawing/2010/main">
+                    <a14:imgLayer r:embed="rId6">
+                      <a14:imgEffect>
+                        <a14:backgroundRemoval t="18534" b="76868" l="20984" r="77311"/>
+                      </a14:imgEffect>
+                    </a14:imgLayer>
+                  </a14:imgProps>
+                </a:ext>
+                <a:ext uri="{28A0092B-C50C-407E-A947-70E740481C1C}">
+                  <a14:useLocalDpi xmlns:a14="http://schemas.microsoft.com/office/drawing/2010/main" val="0"/>
+                </a:ext>
+              </a:extLst>
+            </a:blip>
+            <a:srcRect l="13944" t="11242" r="15647" b="15840"/>
+            <a:stretch/>
+          </p:blipFill>
+          <p:spPr>
+            <a:xfrm rot="16200000">
+              <a:off x="7723528" y="3480071"/>
+              <a:ext cx="137456" cy="137286"/>
+            </a:xfrm>
+            <a:prstGeom prst="rect">
+              <a:avLst/>
+            </a:prstGeom>
+          </p:spPr>
+        </p:pic>
+        <p:cxnSp>
+          <p:nvCxnSpPr>
+            <p:cNvPr id="14" name="Straight Connector 13">
+              <a:extLst>
+                <a:ext uri="{FF2B5EF4-FFF2-40B4-BE49-F238E27FC236}">
+                  <a16:creationId xmlns:a16="http://schemas.microsoft.com/office/drawing/2014/main" id="{8DBFEDAB-8755-4507-8BA8-1069B5DC8565}"/>
+                </a:ext>
+              </a:extLst>
+            </p:cNvPr>
+            <p:cNvCxnSpPr>
+              <a:cxnSpLocks/>
+              <a:stCxn id="11" idx="4"/>
+            </p:cNvCxnSpPr>
+            <p:nvPr/>
+          </p:nvCxnSpPr>
+          <p:spPr>
+            <a:xfrm>
+              <a:off x="7709121" y="4318587"/>
+              <a:ext cx="7759" cy="1502789"/>
+            </a:xfrm>
+            <a:prstGeom prst="line">
+              <a:avLst/>
+            </a:prstGeom>
+          </p:spPr>
+          <p:style>
+            <a:lnRef idx="3">
+              <a:schemeClr val="accent1"/>
+            </a:lnRef>
+            <a:fillRef idx="0">
+              <a:schemeClr val="accent1"/>
+            </a:fillRef>
+            <a:effectRef idx="2">
+              <a:schemeClr val="accent1"/>
+            </a:effectRef>
+            <a:fontRef idx="minor">
+              <a:schemeClr val="tx1"/>
+            </a:fontRef>
+          </p:style>
+        </p:cxnSp>
+        <p:sp>
+          <p:nvSpPr>
+            <p:cNvPr id="15" name="TextBox 14">
+              <a:extLst>
+                <a:ext uri="{FF2B5EF4-FFF2-40B4-BE49-F238E27FC236}">
+                  <a16:creationId xmlns:a16="http://schemas.microsoft.com/office/drawing/2014/main" id="{B57F47FF-59A2-4F3D-B113-A5874976148F}"/>
+                </a:ext>
+              </a:extLst>
+            </p:cNvPr>
+            <p:cNvSpPr txBox="1"/>
+            <p:nvPr/>
+          </p:nvSpPr>
+          <p:spPr>
+            <a:xfrm>
+              <a:off x="7411713" y="3722384"/>
+              <a:ext cx="615114" cy="628259"/>
+            </a:xfrm>
+            <a:prstGeom prst="rect">
+              <a:avLst/>
+            </a:prstGeom>
+            <a:noFill/>
+          </p:spPr>
+          <p:txBody>
+            <a:bodyPr wrap="square" rtlCol="0">
+              <a:spAutoFit/>
+            </a:bodyPr>
+            <a:lstStyle/>
+            <a:p>
+              <a:pPr algn="ctr"/>
+              <a:r>
+                <a:rPr lang="en-US" sz="800" dirty="0">
+                  <a:solidFill>
+                    <a:schemeClr val="bg1"/>
+                  </a:solidFill>
+                  <a:latin typeface="Poppins Light" panose="00000400000000000000" pitchFamily="2" charset="0"/>
+                  <a:cs typeface="Poppins Light" panose="00000400000000000000" pitchFamily="2" charset="0"/>
+                </a:rPr>
+                <a:t>IQ </a:t>
+              </a:r>
+            </a:p>
+            <a:p>
+              <a:pPr algn="ctr"/>
+              <a:endParaRPr lang="en-US" sz="800" dirty="0">
+                <a:solidFill>
+                  <a:schemeClr val="bg1"/>
+                </a:solidFill>
+                <a:latin typeface="Poppins Light" panose="00000400000000000000" pitchFamily="2" charset="0"/>
+                <a:cs typeface="Poppins Light" panose="00000400000000000000" pitchFamily="2" charset="0"/>
+              </a:endParaRPr>
+            </a:p>
+            <a:p>
+              <a:pPr algn="ctr"/>
+              <a:endParaRPr lang="en-US" sz="600" dirty="0">
+                <a:solidFill>
+                  <a:schemeClr val="bg1"/>
+                </a:solidFill>
+                <a:latin typeface="Poppins Light" panose="00000400000000000000" pitchFamily="2" charset="0"/>
+                <a:cs typeface="Poppins Light" panose="00000400000000000000" pitchFamily="2" charset="0"/>
+              </a:endParaRPr>
+            </a:p>
+            <a:p>
+              <a:pPr algn="ctr"/>
+              <a:r>
+                <a:rPr lang="en-US" sz="800" dirty="0">
+                  <a:solidFill>
+                    <a:schemeClr val="bg1"/>
+                  </a:solidFill>
+                  <a:latin typeface="Poppins Light" panose="00000400000000000000" pitchFamily="2" charset="0"/>
+                  <a:cs typeface="Poppins Light" panose="00000400000000000000" pitchFamily="2" charset="0"/>
+                </a:rPr>
+                <a:t>MIXER</a:t>
+              </a:r>
+              <a:endParaRPr lang="LID4096" sz="800" dirty="0">
+                <a:solidFill>
+                  <a:schemeClr val="bg1"/>
+                </a:solidFill>
+                <a:latin typeface="Poppins Light" panose="00000400000000000000" pitchFamily="2" charset="0"/>
+                <a:cs typeface="Poppins Light" panose="00000400000000000000" pitchFamily="2" charset="0"/>
+              </a:endParaRPr>
+            </a:p>
+          </p:txBody>
+        </p:sp>
+        <p:sp>
+          <p:nvSpPr>
+            <p:cNvPr id="16" name="TextBox 15">
+              <a:extLst>
+                <a:ext uri="{FF2B5EF4-FFF2-40B4-BE49-F238E27FC236}">
+                  <a16:creationId xmlns:a16="http://schemas.microsoft.com/office/drawing/2014/main" id="{9370E44B-6066-43B6-A703-20A230133F98}"/>
+                </a:ext>
+              </a:extLst>
+            </p:cNvPr>
+            <p:cNvSpPr txBox="1"/>
+            <p:nvPr/>
+          </p:nvSpPr>
+          <p:spPr>
+            <a:xfrm rot="16200000">
+              <a:off x="7116146" y="4883007"/>
+              <a:ext cx="824793" cy="188855"/>
+            </a:xfrm>
+            <a:prstGeom prst="rect">
+              <a:avLst/>
+            </a:prstGeom>
+            <a:noFill/>
+          </p:spPr>
+          <p:txBody>
+            <a:bodyPr wrap="square" rtlCol="0">
+              <a:spAutoFit/>
+            </a:bodyPr>
+            <a:lstStyle/>
+            <a:p>
+              <a:pPr algn="ctr"/>
+              <a:r>
+                <a:rPr lang="en-US" sz="900" dirty="0">
+                  <a:solidFill>
+                    <a:schemeClr val="bg1"/>
+                  </a:solidFill>
+                  <a:latin typeface="Poppins Light" panose="00000400000000000000" pitchFamily="2" charset="0"/>
+                  <a:cs typeface="Poppins Light" panose="00000400000000000000" pitchFamily="2" charset="0"/>
+                </a:rPr>
+                <a:t>AMP</a:t>
+              </a:r>
+              <a:endParaRPr lang="LID4096" sz="900" dirty="0">
+                <a:solidFill>
+                  <a:schemeClr val="bg1"/>
+                </a:solidFill>
+                <a:latin typeface="Poppins Light" panose="00000400000000000000" pitchFamily="2" charset="0"/>
+                <a:cs typeface="Poppins Light" panose="00000400000000000000" pitchFamily="2" charset="0"/>
+              </a:endParaRPr>
+            </a:p>
+          </p:txBody>
+        </p:sp>
+        <p:cxnSp>
+          <p:nvCxnSpPr>
             <p:cNvPr id="20" name="Straight Connector 19">
               <a:extLst>
                 <a:ext uri="{FF2B5EF4-FFF2-40B4-BE49-F238E27FC236}">
@@ -15148,10 +17049,186 @@
           </a:p>
         </p:txBody>
       </p:sp>
+      <p:cxnSp>
+        <p:nvCxnSpPr>
+          <p:cNvPr id="63" name="Straight Arrow Connector 62">
+            <a:extLst>
+              <a:ext uri="{FF2B5EF4-FFF2-40B4-BE49-F238E27FC236}">
+                <a16:creationId xmlns:a16="http://schemas.microsoft.com/office/drawing/2014/main" id="{C9335C70-6E56-44D6-830B-E7AC98038246}"/>
+              </a:ext>
+            </a:extLst>
+          </p:cNvPr>
+          <p:cNvCxnSpPr>
+            <a:cxnSpLocks/>
+          </p:cNvCxnSpPr>
+          <p:nvPr/>
+        </p:nvCxnSpPr>
+        <p:spPr>
+          <a:xfrm>
+            <a:off x="6933607" y="6587143"/>
+            <a:ext cx="935253" cy="0"/>
+          </a:xfrm>
+          <a:prstGeom prst="straightConnector1">
+            <a:avLst/>
+          </a:prstGeom>
+          <a:ln w="12700">
+            <a:solidFill>
+              <a:srgbClr val="FFFF00"/>
+            </a:solidFill>
+            <a:tailEnd type="triangle"/>
+          </a:ln>
+        </p:spPr>
+        <p:style>
+          <a:lnRef idx="1">
+            <a:schemeClr val="accent1"/>
+          </a:lnRef>
+          <a:fillRef idx="0">
+            <a:schemeClr val="accent1"/>
+          </a:fillRef>
+          <a:effectRef idx="0">
+            <a:schemeClr val="accent1"/>
+          </a:effectRef>
+          <a:fontRef idx="minor">
+            <a:schemeClr val="tx1"/>
+          </a:fontRef>
+        </p:style>
+      </p:cxnSp>
+      <p:cxnSp>
+        <p:nvCxnSpPr>
+          <p:cNvPr id="64" name="Straight Arrow Connector 63">
+            <a:extLst>
+              <a:ext uri="{FF2B5EF4-FFF2-40B4-BE49-F238E27FC236}">
+                <a16:creationId xmlns:a16="http://schemas.microsoft.com/office/drawing/2014/main" id="{4400BC08-DB62-4A73-959D-F321BBB51B3D}"/>
+              </a:ext>
+            </a:extLst>
+          </p:cNvPr>
+          <p:cNvCxnSpPr>
+            <a:cxnSpLocks/>
+          </p:cNvCxnSpPr>
+          <p:nvPr/>
+        </p:nvCxnSpPr>
+        <p:spPr>
+          <a:xfrm flipH="1" flipV="1">
+            <a:off x="6761806" y="6357808"/>
+            <a:ext cx="181632" cy="226681"/>
+          </a:xfrm>
+          <a:prstGeom prst="straightConnector1">
+            <a:avLst/>
+          </a:prstGeom>
+          <a:ln w="12700">
+            <a:solidFill>
+              <a:srgbClr val="FFFF00"/>
+            </a:solidFill>
+            <a:tailEnd type="triangle"/>
+          </a:ln>
+        </p:spPr>
+        <p:style>
+          <a:lnRef idx="1">
+            <a:schemeClr val="accent1"/>
+          </a:lnRef>
+          <a:fillRef idx="0">
+            <a:schemeClr val="accent1"/>
+          </a:fillRef>
+          <a:effectRef idx="0">
+            <a:schemeClr val="accent1"/>
+          </a:effectRef>
+          <a:fontRef idx="minor">
+            <a:schemeClr val="tx1"/>
+          </a:fontRef>
+        </p:style>
+      </p:cxnSp>
+      <p:sp>
+        <p:nvSpPr>
+          <p:cNvPr id="49" name="TextBox 48">
+            <a:extLst>
+              <a:ext uri="{FF2B5EF4-FFF2-40B4-BE49-F238E27FC236}">
+                <a16:creationId xmlns:a16="http://schemas.microsoft.com/office/drawing/2014/main" id="{AD41016D-7659-4C23-AA99-186D374E37AF}"/>
+              </a:ext>
+            </a:extLst>
+          </p:cNvPr>
+          <p:cNvSpPr txBox="1"/>
+          <p:nvPr/>
+        </p:nvSpPr>
+        <p:spPr>
+          <a:xfrm>
+            <a:off x="7225624" y="6492875"/>
+            <a:ext cx="284052" cy="369332"/>
+          </a:xfrm>
+          <a:prstGeom prst="rect">
+            <a:avLst/>
+          </a:prstGeom>
+          <a:noFill/>
+        </p:spPr>
+        <p:txBody>
+          <a:bodyPr wrap="none" rtlCol="0">
+            <a:spAutoFit/>
+          </a:bodyPr>
+          <a:lstStyle/>
+          <a:p>
+            <a:r>
+              <a:rPr lang="en-US" dirty="0">
+                <a:solidFill>
+                  <a:srgbClr val="FFFF00"/>
+                </a:solidFill>
+              </a:rPr>
+              <a:t>x</a:t>
+            </a:r>
+            <a:endParaRPr lang="en-IL" dirty="0">
+              <a:solidFill>
+                <a:srgbClr val="FFFF00"/>
+              </a:solidFill>
+            </a:endParaRPr>
+          </a:p>
+        </p:txBody>
+      </p:sp>
+      <p:sp>
+        <p:nvSpPr>
+          <p:cNvPr id="65" name="TextBox 64">
+            <a:extLst>
+              <a:ext uri="{FF2B5EF4-FFF2-40B4-BE49-F238E27FC236}">
+                <a16:creationId xmlns:a16="http://schemas.microsoft.com/office/drawing/2014/main" id="{00A47A2D-F8AC-4F73-940A-44CE7502DBA6}"/>
+              </a:ext>
+            </a:extLst>
+          </p:cNvPr>
+          <p:cNvSpPr txBox="1"/>
+          <p:nvPr/>
+        </p:nvSpPr>
+        <p:spPr>
+          <a:xfrm>
+            <a:off x="6617375" y="6375500"/>
+            <a:ext cx="288862" cy="369332"/>
+          </a:xfrm>
+          <a:prstGeom prst="rect">
+            <a:avLst/>
+          </a:prstGeom>
+          <a:noFill/>
+        </p:spPr>
+        <p:txBody>
+          <a:bodyPr wrap="none" rtlCol="0">
+            <a:spAutoFit/>
+          </a:bodyPr>
+          <a:lstStyle/>
+          <a:p>
+            <a:r>
+              <a:rPr lang="en-US" dirty="0">
+                <a:solidFill>
+                  <a:srgbClr val="FFFF00"/>
+                </a:solidFill>
+              </a:rPr>
+              <a:t>y</a:t>
+            </a:r>
+            <a:endParaRPr lang="en-IL" dirty="0">
+              <a:solidFill>
+                <a:srgbClr val="FFFF00"/>
+              </a:solidFill>
+            </a:endParaRPr>
+          </a:p>
+        </p:txBody>
+      </p:sp>
     </p:spTree>
     <p:extLst>
       <p:ext uri="{BB962C8B-B14F-4D97-AF65-F5344CB8AC3E}">
-        <p14:creationId xmlns:p14="http://schemas.microsoft.com/office/powerpoint/2010/main" val="1485663935"/>
+        <p14:creationId xmlns:p14="http://schemas.microsoft.com/office/powerpoint/2010/main" val="449545146"/>
       </p:ext>
     </p:extLst>
   </p:cSld>
@@ -15161,7 +17238,7 @@
 </p:sld>
 </file>
 
-<file path=ppt/slides/slide17.xml><?xml version="1.0" encoding="utf-8"?>
+<file path=ppt/slides/slide18.xml><?xml version="1.0" encoding="utf-8"?>
 <p:sld xmlns:a="http://schemas.openxmlformats.org/drawingml/2006/main" xmlns:r="http://schemas.openxmlformats.org/officeDocument/2006/relationships" xmlns:p="http://schemas.openxmlformats.org/presentationml/2006/main">
   <p:cSld>
     <p:spTree>
@@ -15221,7 +17298,7 @@
         </p:nvSpPr>
         <p:spPr>
           <a:xfrm>
-            <a:off x="2895600" y="1443039"/>
+            <a:off x="1754698" y="3280227"/>
             <a:ext cx="1447800" cy="923925"/>
           </a:xfrm>
           <a:prstGeom prst="rect">
@@ -15249,7 +17326,7 @@
             <a:pPr algn="ctr"/>
             <a:r>
               <a:rPr lang="en-US" dirty="0"/>
-              <a:t>Run OPX Program</a:t>
+              <a:t>Run Qua Program</a:t>
             </a:r>
             <a:endParaRPr lang="en-IL" dirty="0"/>
           </a:p>
@@ -15269,7 +17346,7 @@
         </p:nvSpPr>
         <p:spPr>
           <a:xfrm>
-            <a:off x="5076825" y="1443038"/>
+            <a:off x="3759755" y="3280227"/>
             <a:ext cx="1447800" cy="923925"/>
           </a:xfrm>
           <a:prstGeom prst="rect">
@@ -15297,15 +17374,7 @@
             <a:pPr algn="ctr"/>
             <a:r>
               <a:rPr lang="en-US" dirty="0"/>
-              <a:t>Program pauses </a:t>
-            </a:r>
-            <a:r>
-              <a:rPr lang="en-US" dirty="0" err="1"/>
-              <a:t>Nx</a:t>
-            </a:r>
-            <a:r>
-              <a:rPr lang="en-US" dirty="0"/>
-              <a:t>*Ny times</a:t>
+              <a:t>pause</a:t>
             </a:r>
             <a:endParaRPr lang="en-IL" dirty="0"/>
           </a:p>
@@ -15313,10 +17382,10 @@
       </p:sp>
       <p:sp>
         <p:nvSpPr>
-          <p:cNvPr id="13" name="Rectangle 12">
+          <p:cNvPr id="14" name="Rectangle 13">
             <a:extLst>
               <a:ext uri="{FF2B5EF4-FFF2-40B4-BE49-F238E27FC236}">
-                <a16:creationId xmlns:a16="http://schemas.microsoft.com/office/drawing/2014/main" id="{AE75B620-73FC-4E41-BC0D-4F99FB27EF1E}"/>
+                <a16:creationId xmlns:a16="http://schemas.microsoft.com/office/drawing/2014/main" id="{60085375-58A8-4217-B7AE-9F88142CBAB1}"/>
               </a:ext>
             </a:extLst>
           </p:cNvPr>
@@ -15325,7 +17394,7 @@
         </p:nvSpPr>
         <p:spPr>
           <a:xfrm>
-            <a:off x="5076825" y="2754313"/>
+            <a:off x="5322659" y="4733746"/>
             <a:ext cx="1447800" cy="923925"/>
           </a:xfrm>
           <a:prstGeom prst="rect">
@@ -15353,18 +17422,110 @@
             <a:pPr algn="ctr"/>
             <a:r>
               <a:rPr lang="en-US" dirty="0"/>
-              <a:t>Move Stages to correct location</a:t>
+              <a:t>Move Stage to new location</a:t>
             </a:r>
             <a:endParaRPr lang="en-IL" dirty="0"/>
           </a:p>
         </p:txBody>
       </p:sp>
+      <p:pic>
+        <p:nvPicPr>
+          <p:cNvPr id="8" name="Picture 7">
+            <a:extLst>
+              <a:ext uri="{FF2B5EF4-FFF2-40B4-BE49-F238E27FC236}">
+                <a16:creationId xmlns:a16="http://schemas.microsoft.com/office/drawing/2014/main" id="{7495242C-8317-4AB0-AED5-4B47675C7C23}"/>
+              </a:ext>
+            </a:extLst>
+          </p:cNvPr>
+          <p:cNvPicPr>
+            <a:picLocks noChangeAspect="1"/>
+          </p:cNvPicPr>
+          <p:nvPr/>
+        </p:nvPicPr>
+        <p:blipFill>
+          <a:blip r:embed="rId2">
+            <a:extLst>
+              <a:ext uri="{28A0092B-C50C-407E-A947-70E740481C1C}">
+                <a14:useLocalDpi xmlns:a14="http://schemas.microsoft.com/office/drawing/2010/main" val="0"/>
+              </a:ext>
+            </a:extLst>
+          </a:blip>
+          <a:stretch>
+            <a:fillRect/>
+          </a:stretch>
+        </p:blipFill>
+        <p:spPr>
+          <a:xfrm>
+            <a:off x="1679343" y="2877716"/>
+            <a:ext cx="1598510" cy="754686"/>
+          </a:xfrm>
+          <a:prstGeom prst="rect">
+            <a:avLst/>
+          </a:prstGeom>
+        </p:spPr>
+      </p:pic>
+      <p:pic>
+        <p:nvPicPr>
+          <p:cNvPr id="10" name="Picture 6" descr="Computer Symbol Vector Images (over 950,000)">
+            <a:extLst>
+              <a:ext uri="{FF2B5EF4-FFF2-40B4-BE49-F238E27FC236}">
+                <a16:creationId xmlns:a16="http://schemas.microsoft.com/office/drawing/2014/main" id="{B33F0EE3-E309-4E27-8DCF-6A61601494F7}"/>
+              </a:ext>
+            </a:extLst>
+          </p:cNvPr>
+          <p:cNvPicPr>
+            <a:picLocks noChangeAspect="1" noChangeArrowheads="1"/>
+          </p:cNvPicPr>
+          <p:nvPr/>
+        </p:nvPicPr>
+        <p:blipFill>
+          <a:blip r:embed="rId3">
+            <a:extLst>
+              <a:ext uri="{BEBA8EAE-BF5A-486C-A8C5-ECC9F3942E4B}">
+                <a14:imgProps xmlns:a14="http://schemas.microsoft.com/office/drawing/2010/main">
+                  <a14:imgLayer r:embed="rId4">
+                    <a14:imgEffect>
+                      <a14:backgroundRemoval t="10000" b="90000" l="10000" r="90000"/>
+                    </a14:imgEffect>
+                  </a14:imgLayer>
+                </a14:imgProps>
+              </a:ext>
+              <a:ext uri="{28A0092B-C50C-407E-A947-70E740481C1C}">
+                <a14:useLocalDpi xmlns:a14="http://schemas.microsoft.com/office/drawing/2010/main" val="0"/>
+              </a:ext>
+            </a:extLst>
+          </a:blip>
+          <a:srcRect/>
+          <a:stretch>
+            <a:fillRect/>
+          </a:stretch>
+        </p:blipFill>
+        <p:spPr bwMode="auto">
+          <a:xfrm>
+            <a:off x="4971283" y="4204152"/>
+            <a:ext cx="2167329" cy="2276606"/>
+          </a:xfrm>
+          <a:prstGeom prst="rect">
+            <a:avLst/>
+          </a:prstGeom>
+          <a:noFill/>
+          <a:extLst>
+            <a:ext uri="{909E8E84-426E-40DD-AFC4-6F175D3DCCD1}">
+              <a14:hiddenFill xmlns:a14="http://schemas.microsoft.com/office/drawing/2010/main">
+                <a:solidFill>
+                  <a:srgbClr val="FFFFFF"/>
+                </a:solidFill>
+              </a14:hiddenFill>
+            </a:ext>
+          </a:extLst>
+        </p:spPr>
+      </p:pic>
       <p:sp>
         <p:nvSpPr>
-          <p:cNvPr id="14" name="Rectangle 13">
+          <p:cNvPr id="16" name="Rectangle 15">
             <a:extLst>
               <a:ext uri="{FF2B5EF4-FFF2-40B4-BE49-F238E27FC236}">
-                <a16:creationId xmlns:a16="http://schemas.microsoft.com/office/drawing/2014/main" id="{60085375-58A8-4217-B7AE-9F88142CBAB1}"/>
+                <a16:creationId xmlns:a16="http://schemas.microsoft.com/office/drawing/2014/main" id="{0B2644E6-EB23-423D-866B-D7843EC04125}"/>
               </a:ext>
             </a:extLst>
           </p:cNvPr>
@@ -15373,7 +17534,7 @@
         </p:nvSpPr>
         <p:spPr>
           <a:xfrm>
-            <a:off x="5076825" y="4024311"/>
+            <a:off x="6930883" y="3280227"/>
             <a:ext cx="1447800" cy="923925"/>
           </a:xfrm>
           <a:prstGeom prst="rect">
@@ -15401,7 +17562,7 @@
             <a:pPr algn="ctr"/>
             <a:r>
               <a:rPr lang="en-US" dirty="0"/>
-              <a:t>Move Stages to correct location</a:t>
+              <a:t>resume</a:t>
             </a:r>
             <a:endParaRPr lang="en-IL" dirty="0"/>
           </a:p>
@@ -15409,10 +17570,10 @@
       </p:sp>
       <p:sp>
         <p:nvSpPr>
-          <p:cNvPr id="15" name="Rectangle 14">
+          <p:cNvPr id="17" name="Rectangle 16">
             <a:extLst>
               <a:ext uri="{FF2B5EF4-FFF2-40B4-BE49-F238E27FC236}">
-                <a16:creationId xmlns:a16="http://schemas.microsoft.com/office/drawing/2014/main" id="{A2772C58-30FA-451F-8587-A7381A5DB4E9}"/>
+                <a16:creationId xmlns:a16="http://schemas.microsoft.com/office/drawing/2014/main" id="{CED5BE01-A7FF-4858-BD07-A141184C84B9}"/>
               </a:ext>
             </a:extLst>
           </p:cNvPr>
@@ -15421,7 +17582,7 @@
         </p:nvSpPr>
         <p:spPr>
           <a:xfrm>
-            <a:off x="5448300" y="4005263"/>
+            <a:off x="8939316" y="3280227"/>
             <a:ext cx="1447800" cy="923925"/>
           </a:xfrm>
           <a:prstGeom prst="rect">
@@ -15449,9 +17610,455 @@
             <a:pPr algn="ctr"/>
             <a:r>
               <a:rPr lang="en-US" dirty="0"/>
-              <a:t>Move Stages to correct location</a:t>
+              <a:t>Measure g2</a:t>
             </a:r>
             <a:endParaRPr lang="en-IL" dirty="0"/>
+          </a:p>
+        </p:txBody>
+      </p:sp>
+      <p:sp>
+        <p:nvSpPr>
+          <p:cNvPr id="3" name="Arrow: Left 2">
+            <a:extLst>
+              <a:ext uri="{FF2B5EF4-FFF2-40B4-BE49-F238E27FC236}">
+                <a16:creationId xmlns:a16="http://schemas.microsoft.com/office/drawing/2014/main" id="{CEA360F9-5C1D-458F-A9D4-81C6C9F40B13}"/>
+              </a:ext>
+            </a:extLst>
+          </p:cNvPr>
+          <p:cNvSpPr/>
+          <p:nvPr/>
+        </p:nvSpPr>
+        <p:spPr>
+          <a:xfrm rot="10800000">
+            <a:off x="3303081" y="3632402"/>
+            <a:ext cx="386271" cy="229993"/>
+          </a:xfrm>
+          <a:prstGeom prst="leftArrow">
+            <a:avLst/>
+          </a:prstGeom>
+        </p:spPr>
+        <p:style>
+          <a:lnRef idx="2">
+            <a:schemeClr val="accent1">
+              <a:shade val="50000"/>
+            </a:schemeClr>
+          </a:lnRef>
+          <a:fillRef idx="1">
+            <a:schemeClr val="accent1"/>
+          </a:fillRef>
+          <a:effectRef idx="0">
+            <a:schemeClr val="accent1"/>
+          </a:effectRef>
+          <a:fontRef idx="minor">
+            <a:schemeClr val="lt1"/>
+          </a:fontRef>
+        </p:style>
+        <p:txBody>
+          <a:bodyPr rtlCol="0" anchor="ctr"/>
+          <a:lstStyle/>
+          <a:p>
+            <a:pPr algn="ctr"/>
+            <a:endParaRPr lang="en-IL"/>
+          </a:p>
+        </p:txBody>
+      </p:sp>
+      <p:sp>
+        <p:nvSpPr>
+          <p:cNvPr id="18" name="Arrow: Left 17">
+            <a:extLst>
+              <a:ext uri="{FF2B5EF4-FFF2-40B4-BE49-F238E27FC236}">
+                <a16:creationId xmlns:a16="http://schemas.microsoft.com/office/drawing/2014/main" id="{C199F7C4-B548-4396-A40D-17F7E0BC84EB}"/>
+              </a:ext>
+            </a:extLst>
+          </p:cNvPr>
+          <p:cNvSpPr/>
+          <p:nvPr/>
+        </p:nvSpPr>
+        <p:spPr>
+          <a:xfrm rot="10800000">
+            <a:off x="8489080" y="3627192"/>
+            <a:ext cx="386271" cy="229993"/>
+          </a:xfrm>
+          <a:prstGeom prst="leftArrow">
+            <a:avLst/>
+          </a:prstGeom>
+        </p:spPr>
+        <p:style>
+          <a:lnRef idx="2">
+            <a:schemeClr val="accent1">
+              <a:shade val="50000"/>
+            </a:schemeClr>
+          </a:lnRef>
+          <a:fillRef idx="1">
+            <a:schemeClr val="accent1"/>
+          </a:fillRef>
+          <a:effectRef idx="0">
+            <a:schemeClr val="accent1"/>
+          </a:effectRef>
+          <a:fontRef idx="minor">
+            <a:schemeClr val="lt1"/>
+          </a:fontRef>
+        </p:style>
+        <p:txBody>
+          <a:bodyPr rtlCol="0" anchor="ctr"/>
+          <a:lstStyle/>
+          <a:p>
+            <a:pPr algn="ctr"/>
+            <a:endParaRPr lang="en-IL"/>
+          </a:p>
+        </p:txBody>
+      </p:sp>
+      <p:sp>
+        <p:nvSpPr>
+          <p:cNvPr id="4" name="Arrow: Bent-Up 3">
+            <a:extLst>
+              <a:ext uri="{FF2B5EF4-FFF2-40B4-BE49-F238E27FC236}">
+                <a16:creationId xmlns:a16="http://schemas.microsoft.com/office/drawing/2014/main" id="{8966764C-7BBE-402F-9F84-23E531B7238F}"/>
+              </a:ext>
+            </a:extLst>
+          </p:cNvPr>
+          <p:cNvSpPr/>
+          <p:nvPr/>
+        </p:nvSpPr>
+        <p:spPr>
+          <a:xfrm>
+            <a:off x="6930883" y="4271783"/>
+            <a:ext cx="484985" cy="923925"/>
+          </a:xfrm>
+          <a:prstGeom prst="bentUpArrow">
+            <a:avLst/>
+          </a:prstGeom>
+        </p:spPr>
+        <p:style>
+          <a:lnRef idx="2">
+            <a:schemeClr val="accent1">
+              <a:shade val="50000"/>
+            </a:schemeClr>
+          </a:lnRef>
+          <a:fillRef idx="1">
+            <a:schemeClr val="accent1"/>
+          </a:fillRef>
+          <a:effectRef idx="0">
+            <a:schemeClr val="accent1"/>
+          </a:effectRef>
+          <a:fontRef idx="minor">
+            <a:schemeClr val="lt1"/>
+          </a:fontRef>
+        </p:style>
+        <p:txBody>
+          <a:bodyPr rtlCol="0" anchor="ctr"/>
+          <a:lstStyle/>
+          <a:p>
+            <a:pPr algn="ctr"/>
+            <a:endParaRPr lang="en-IL"/>
+          </a:p>
+        </p:txBody>
+      </p:sp>
+      <p:pic>
+        <p:nvPicPr>
+          <p:cNvPr id="19" name="Picture 18">
+            <a:extLst>
+              <a:ext uri="{FF2B5EF4-FFF2-40B4-BE49-F238E27FC236}">
+                <a16:creationId xmlns:a16="http://schemas.microsoft.com/office/drawing/2014/main" id="{1F310466-44FE-4116-B132-306291A7E0DC}"/>
+              </a:ext>
+            </a:extLst>
+          </p:cNvPr>
+          <p:cNvPicPr>
+            <a:picLocks noChangeAspect="1"/>
+          </p:cNvPicPr>
+          <p:nvPr/>
+        </p:nvPicPr>
+        <p:blipFill>
+          <a:blip r:embed="rId2">
+            <a:extLst>
+              <a:ext uri="{28A0092B-C50C-407E-A947-70E740481C1C}">
+                <a14:useLocalDpi xmlns:a14="http://schemas.microsoft.com/office/drawing/2010/main" val="0"/>
+              </a:ext>
+            </a:extLst>
+          </a:blip>
+          <a:stretch>
+            <a:fillRect/>
+          </a:stretch>
+        </p:blipFill>
+        <p:spPr>
+          <a:xfrm>
+            <a:off x="3671454" y="2877716"/>
+            <a:ext cx="1598510" cy="754686"/>
+          </a:xfrm>
+          <a:prstGeom prst="rect">
+            <a:avLst/>
+          </a:prstGeom>
+        </p:spPr>
+      </p:pic>
+      <p:pic>
+        <p:nvPicPr>
+          <p:cNvPr id="20" name="Picture 19">
+            <a:extLst>
+              <a:ext uri="{FF2B5EF4-FFF2-40B4-BE49-F238E27FC236}">
+                <a16:creationId xmlns:a16="http://schemas.microsoft.com/office/drawing/2014/main" id="{D74A9A5B-1B88-4B4B-893A-FF0AB1C772CB}"/>
+              </a:ext>
+            </a:extLst>
+          </p:cNvPr>
+          <p:cNvPicPr>
+            <a:picLocks noChangeAspect="1"/>
+          </p:cNvPicPr>
+          <p:nvPr/>
+        </p:nvPicPr>
+        <p:blipFill>
+          <a:blip r:embed="rId2">
+            <a:extLst>
+              <a:ext uri="{28A0092B-C50C-407E-A947-70E740481C1C}">
+                <a14:useLocalDpi xmlns:a14="http://schemas.microsoft.com/office/drawing/2010/main" val="0"/>
+              </a:ext>
+            </a:extLst>
+          </a:blip>
+          <a:stretch>
+            <a:fillRect/>
+          </a:stretch>
+        </p:blipFill>
+        <p:spPr>
+          <a:xfrm>
+            <a:off x="6855528" y="2919102"/>
+            <a:ext cx="1598510" cy="754686"/>
+          </a:xfrm>
+          <a:prstGeom prst="rect">
+            <a:avLst/>
+          </a:prstGeom>
+        </p:spPr>
+      </p:pic>
+      <p:pic>
+        <p:nvPicPr>
+          <p:cNvPr id="21" name="Picture 20">
+            <a:extLst>
+              <a:ext uri="{FF2B5EF4-FFF2-40B4-BE49-F238E27FC236}">
+                <a16:creationId xmlns:a16="http://schemas.microsoft.com/office/drawing/2014/main" id="{E898777D-D474-4C3D-A58E-54B00D99C8A4}"/>
+              </a:ext>
+            </a:extLst>
+          </p:cNvPr>
+          <p:cNvPicPr>
+            <a:picLocks noChangeAspect="1"/>
+          </p:cNvPicPr>
+          <p:nvPr/>
+        </p:nvPicPr>
+        <p:blipFill>
+          <a:blip r:embed="rId2">
+            <a:extLst>
+              <a:ext uri="{28A0092B-C50C-407E-A947-70E740481C1C}">
+                <a14:useLocalDpi xmlns:a14="http://schemas.microsoft.com/office/drawing/2010/main" val="0"/>
+              </a:ext>
+            </a:extLst>
+          </a:blip>
+          <a:stretch>
+            <a:fillRect/>
+          </a:stretch>
+        </p:blipFill>
+        <p:spPr>
+          <a:xfrm>
+            <a:off x="8863961" y="2910283"/>
+            <a:ext cx="1598510" cy="754686"/>
+          </a:xfrm>
+          <a:prstGeom prst="rect">
+            <a:avLst/>
+          </a:prstGeom>
+        </p:spPr>
+      </p:pic>
+      <p:sp>
+        <p:nvSpPr>
+          <p:cNvPr id="22" name="Arrow: Bent-Up 21">
+            <a:extLst>
+              <a:ext uri="{FF2B5EF4-FFF2-40B4-BE49-F238E27FC236}">
+                <a16:creationId xmlns:a16="http://schemas.microsoft.com/office/drawing/2014/main" id="{1799CC3A-0F6D-4AB0-B95A-EB9208BFE0D1}"/>
+              </a:ext>
+            </a:extLst>
+          </p:cNvPr>
+          <p:cNvSpPr/>
+          <p:nvPr/>
+        </p:nvSpPr>
+        <p:spPr>
+          <a:xfrm rot="5400000">
+            <a:off x="4442515" y="4533408"/>
+            <a:ext cx="923925" cy="484987"/>
+          </a:xfrm>
+          <a:prstGeom prst="bentUpArrow">
+            <a:avLst/>
+          </a:prstGeom>
+        </p:spPr>
+        <p:style>
+          <a:lnRef idx="2">
+            <a:schemeClr val="accent1">
+              <a:shade val="50000"/>
+            </a:schemeClr>
+          </a:lnRef>
+          <a:fillRef idx="1">
+            <a:schemeClr val="accent1"/>
+          </a:fillRef>
+          <a:effectRef idx="0">
+            <a:schemeClr val="accent1"/>
+          </a:effectRef>
+          <a:fontRef idx="minor">
+            <a:schemeClr val="lt1"/>
+          </a:fontRef>
+        </p:style>
+        <p:txBody>
+          <a:bodyPr rtlCol="0" anchor="ctr"/>
+          <a:lstStyle/>
+          <a:p>
+            <a:pPr algn="ctr"/>
+            <a:endParaRPr lang="en-IL"/>
+          </a:p>
+        </p:txBody>
+      </p:sp>
+      <p:sp>
+        <p:nvSpPr>
+          <p:cNvPr id="29" name="Arrow: Bent-Up 28">
+            <a:extLst>
+              <a:ext uri="{FF2B5EF4-FFF2-40B4-BE49-F238E27FC236}">
+                <a16:creationId xmlns:a16="http://schemas.microsoft.com/office/drawing/2014/main" id="{723C49D0-A338-41A3-A2C9-A5CE2B326DF3}"/>
+              </a:ext>
+            </a:extLst>
+          </p:cNvPr>
+          <p:cNvSpPr/>
+          <p:nvPr/>
+        </p:nvSpPr>
+        <p:spPr>
+          <a:xfrm rot="10800000">
+            <a:off x="4261605" y="2463562"/>
+            <a:ext cx="1998791" cy="464140"/>
+          </a:xfrm>
+          <a:prstGeom prst="bentUpArrow">
+            <a:avLst/>
+          </a:prstGeom>
+        </p:spPr>
+        <p:style>
+          <a:lnRef idx="2">
+            <a:schemeClr val="accent1">
+              <a:shade val="50000"/>
+            </a:schemeClr>
+          </a:lnRef>
+          <a:fillRef idx="1">
+            <a:schemeClr val="accent1"/>
+          </a:fillRef>
+          <a:effectRef idx="0">
+            <a:schemeClr val="accent1"/>
+          </a:effectRef>
+          <a:fontRef idx="minor">
+            <a:schemeClr val="lt1"/>
+          </a:fontRef>
+        </p:style>
+        <p:txBody>
+          <a:bodyPr rtlCol="0" anchor="ctr"/>
+          <a:lstStyle/>
+          <a:p>
+            <a:pPr algn="ctr"/>
+            <a:endParaRPr lang="en-IL"/>
+          </a:p>
+        </p:txBody>
+      </p:sp>
+      <p:sp>
+        <p:nvSpPr>
+          <p:cNvPr id="28" name="Arrow: Bent-Up 27">
+            <a:extLst>
+              <a:ext uri="{FF2B5EF4-FFF2-40B4-BE49-F238E27FC236}">
+                <a16:creationId xmlns:a16="http://schemas.microsoft.com/office/drawing/2014/main" id="{4C3E223E-181B-476D-8AED-0BFFCDEF86B8}"/>
+              </a:ext>
+            </a:extLst>
+          </p:cNvPr>
+          <p:cNvSpPr/>
+          <p:nvPr/>
+        </p:nvSpPr>
+        <p:spPr>
+          <a:xfrm rot="16200000">
+            <a:off x="7640656" y="862985"/>
+            <a:ext cx="477905" cy="3567215"/>
+          </a:xfrm>
+          <a:prstGeom prst="bentUpArrow">
+            <a:avLst/>
+          </a:prstGeom>
+        </p:spPr>
+        <p:style>
+          <a:lnRef idx="2">
+            <a:schemeClr val="accent1">
+              <a:shade val="50000"/>
+            </a:schemeClr>
+          </a:lnRef>
+          <a:fillRef idx="1">
+            <a:schemeClr val="accent1"/>
+          </a:fillRef>
+          <a:effectRef idx="0">
+            <a:schemeClr val="accent1"/>
+          </a:effectRef>
+          <a:fontRef idx="minor">
+            <a:schemeClr val="lt1"/>
+          </a:fontRef>
+        </p:style>
+        <p:txBody>
+          <a:bodyPr rtlCol="0" anchor="ctr"/>
+          <a:lstStyle/>
+          <a:p>
+            <a:pPr algn="ctr"/>
+            <a:endParaRPr lang="en-IL"/>
+          </a:p>
+        </p:txBody>
+      </p:sp>
+      <p:sp>
+        <p:nvSpPr>
+          <p:cNvPr id="30" name="TextBox 29">
+            <a:extLst>
+              <a:ext uri="{FF2B5EF4-FFF2-40B4-BE49-F238E27FC236}">
+                <a16:creationId xmlns:a16="http://schemas.microsoft.com/office/drawing/2014/main" id="{03CDE25F-5997-4A9C-BC9A-CA62B8336DB2}"/>
+              </a:ext>
+            </a:extLst>
+          </p:cNvPr>
+          <p:cNvSpPr txBox="1"/>
+          <p:nvPr/>
+        </p:nvSpPr>
+        <p:spPr>
+          <a:xfrm>
+            <a:off x="5687726" y="2340426"/>
+            <a:ext cx="2191882" cy="369332"/>
+          </a:xfrm>
+          <a:prstGeom prst="rect">
+            <a:avLst/>
+          </a:prstGeom>
+          <a:solidFill>
+            <a:srgbClr val="ABABAD"/>
+          </a:solidFill>
+        </p:spPr>
+        <p:txBody>
+          <a:bodyPr wrap="none" rtlCol="0">
+            <a:spAutoFit/>
+          </a:bodyPr>
+          <a:lstStyle/>
+          <a:p>
+            <a:r>
+              <a:rPr lang="en-US" dirty="0">
+                <a:solidFill>
+                  <a:schemeClr val="bg1"/>
+                </a:solidFill>
+              </a:rPr>
+              <a:t>Repeat </a:t>
+            </a:r>
+            <a:r>
+              <a:rPr lang="en-US" dirty="0" err="1">
+                <a:solidFill>
+                  <a:schemeClr val="bg1"/>
+                </a:solidFill>
+              </a:rPr>
+              <a:t>Nx</a:t>
+            </a:r>
+            <a:r>
+              <a:rPr lang="en-US" dirty="0">
+                <a:solidFill>
+                  <a:schemeClr val="bg1"/>
+                </a:solidFill>
+              </a:rPr>
+              <a:t> * Ny times</a:t>
+            </a:r>
+            <a:endParaRPr lang="en-IL" dirty="0">
+              <a:solidFill>
+                <a:schemeClr val="bg1"/>
+              </a:solidFill>
+            </a:endParaRPr>
           </a:p>
         </p:txBody>
       </p:sp>
@@ -15459,139 +18066,6 @@
     <p:extLst>
       <p:ext uri="{BB962C8B-B14F-4D97-AF65-F5344CB8AC3E}">
         <p14:creationId xmlns:p14="http://schemas.microsoft.com/office/powerpoint/2010/main" val="502004801"/>
-      </p:ext>
-    </p:extLst>
-  </p:cSld>
-  <p:clrMapOvr>
-    <a:masterClrMapping/>
-  </p:clrMapOvr>
-</p:sld>
-</file>
-
-<file path=ppt/slides/slide18.xml><?xml version="1.0" encoding="utf-8"?>
-<p:sld xmlns:a="http://schemas.openxmlformats.org/drawingml/2006/main" xmlns:r="http://schemas.openxmlformats.org/officeDocument/2006/relationships" xmlns:p="http://schemas.openxmlformats.org/presentationml/2006/main" show="0">
-  <p:cSld>
-    <p:spTree>
-      <p:nvGrpSpPr>
-        <p:cNvPr id="1" name=""/>
-        <p:cNvGrpSpPr/>
-        <p:nvPr/>
-      </p:nvGrpSpPr>
-      <p:grpSpPr>
-        <a:xfrm>
-          <a:off x="0" y="0"/>
-          <a:ext cx="0" cy="0"/>
-          <a:chOff x="0" y="0"/>
-          <a:chExt cx="0" cy="0"/>
-        </a:xfrm>
-      </p:grpSpPr>
-      <p:sp>
-        <p:nvSpPr>
-          <p:cNvPr id="2" name="Title 1">
-            <a:extLst>
-              <a:ext uri="{FF2B5EF4-FFF2-40B4-BE49-F238E27FC236}">
-                <a16:creationId xmlns:a16="http://schemas.microsoft.com/office/drawing/2014/main" id="{0F78285E-C5EB-4EB2-B52D-9EA53F184AA0}"/>
-              </a:ext>
-            </a:extLst>
-          </p:cNvPr>
-          <p:cNvSpPr>
-            <a:spLocks noGrp="1"/>
-          </p:cNvSpPr>
-          <p:nvPr>
-            <p:ph type="title"/>
-          </p:nvPr>
-        </p:nvSpPr>
-        <p:spPr/>
-        <p:txBody>
-          <a:bodyPr/>
-          <a:lstStyle/>
-          <a:p>
-            <a:r>
-              <a:rPr lang="en-US" dirty="0"/>
-              <a:t>Widefield ODMR</a:t>
-            </a:r>
-            <a:endParaRPr lang="en-IL" dirty="0"/>
-          </a:p>
-        </p:txBody>
-      </p:sp>
-      <p:sp>
-        <p:nvSpPr>
-          <p:cNvPr id="3" name="Content Placeholder 2">
-            <a:extLst>
-              <a:ext uri="{FF2B5EF4-FFF2-40B4-BE49-F238E27FC236}">
-                <a16:creationId xmlns:a16="http://schemas.microsoft.com/office/drawing/2014/main" id="{789FD1C7-ADC9-407A-BAE9-AE11567B5EC3}"/>
-              </a:ext>
-            </a:extLst>
-          </p:cNvPr>
-          <p:cNvSpPr>
-            <a:spLocks noGrp="1"/>
-          </p:cNvSpPr>
-          <p:nvPr>
-            <p:ph idx="1"/>
-          </p:nvPr>
-        </p:nvSpPr>
-        <p:spPr>
-          <a:xfrm>
-            <a:off x="838200" y="1825625"/>
-            <a:ext cx="5449824" cy="4351338"/>
-          </a:xfrm>
-        </p:spPr>
-        <p:txBody>
-          <a:bodyPr/>
-          <a:lstStyle/>
-          <a:p>
-            <a:endParaRPr lang="en-US" dirty="0"/>
-          </a:p>
-          <a:p>
-            <a:r>
-              <a:rPr lang="en-US" dirty="0"/>
-              <a:t>Simple CW ODMR, measuring for 10ms with MW and 10ms without</a:t>
-            </a:r>
-          </a:p>
-          <a:p>
-            <a:endParaRPr lang="en-US" dirty="0"/>
-          </a:p>
-        </p:txBody>
-      </p:sp>
-      <p:pic>
-        <p:nvPicPr>
-          <p:cNvPr id="5" name="Picture 4">
-            <a:extLst>
-              <a:ext uri="{FF2B5EF4-FFF2-40B4-BE49-F238E27FC236}">
-                <a16:creationId xmlns:a16="http://schemas.microsoft.com/office/drawing/2014/main" id="{5B6ABBE8-295C-49AE-85A8-CC509FAE01F8}"/>
-              </a:ext>
-            </a:extLst>
-          </p:cNvPr>
-          <p:cNvPicPr>
-            <a:picLocks noChangeAspect="1"/>
-          </p:cNvPicPr>
-          <p:nvPr/>
-        </p:nvPicPr>
-        <p:blipFill rotWithShape="1">
-          <a:blip r:embed="rId2">
-            <a:extLst>
-              <a:ext uri="{28A0092B-C50C-407E-A947-70E740481C1C}">
-                <a14:useLocalDpi xmlns:a14="http://schemas.microsoft.com/office/drawing/2010/main" val="0"/>
-              </a:ext>
-            </a:extLst>
-          </a:blip>
-          <a:srcRect l="5341" t="7451" r="5038" b="7736"/>
-          <a:stretch/>
-        </p:blipFill>
-        <p:spPr>
-          <a:xfrm>
-            <a:off x="6328444" y="1453896"/>
-            <a:ext cx="5220206" cy="4247500"/>
-          </a:xfrm>
-          <a:prstGeom prst="rect">
-            <a:avLst/>
-          </a:prstGeom>
-        </p:spPr>
-      </p:pic>
-    </p:spTree>
-    <p:extLst>
-      <p:ext uri="{BB962C8B-B14F-4D97-AF65-F5344CB8AC3E}">
-        <p14:creationId xmlns:p14="http://schemas.microsoft.com/office/powerpoint/2010/main" val="2378756979"/>
       </p:ext>
     </p:extLst>
   </p:cSld>
@@ -15678,24 +18152,11 @@
           <a:p>
             <a:r>
               <a:rPr lang="en-US" dirty="0"/>
-              <a:t>If it has high enough FPS, can do  quick measurement without reference.</a:t>
+              <a:t>Simple CW ODMR, measuring for 10ms with MW and 10ms without</a:t>
             </a:r>
           </a:p>
           <a:p>
             <a:endParaRPr lang="en-US" dirty="0"/>
-          </a:p>
-          <a:p>
-            <a:r>
-              <a:rPr lang="en-US" dirty="0"/>
-              <a:t>Frequency change is ~200ns long.</a:t>
-            </a:r>
-            <a:br>
-              <a:rPr lang="en-US" dirty="0"/>
-            </a:br>
-            <a:r>
-              <a:rPr lang="en-US" dirty="0"/>
-              <a:t>1us added for clarity.</a:t>
-            </a:r>
           </a:p>
         </p:txBody>
       </p:sp>
@@ -15721,13 +18182,13 @@
               </a:ext>
             </a:extLst>
           </a:blip>
-          <a:srcRect l="6465" t="9144" r="4426" b="8108"/>
+          <a:srcRect l="5341" t="7451" r="5038" b="7736"/>
           <a:stretch/>
         </p:blipFill>
         <p:spPr>
           <a:xfrm>
-            <a:off x="6355080" y="1508760"/>
-            <a:ext cx="5449824" cy="4351338"/>
+            <a:off x="6328444" y="1453896"/>
+            <a:ext cx="5220206" cy="4247500"/>
           </a:xfrm>
           <a:prstGeom prst="rect">
             <a:avLst/>
@@ -15737,7 +18198,7 @@
     </p:spTree>
     <p:extLst>
       <p:ext uri="{BB962C8B-B14F-4D97-AF65-F5344CB8AC3E}">
-        <p14:creationId xmlns:p14="http://schemas.microsoft.com/office/powerpoint/2010/main" val="1211262777"/>
+        <p14:creationId xmlns:p14="http://schemas.microsoft.com/office/powerpoint/2010/main" val="2378756979"/>
       </p:ext>
     </p:extLst>
   </p:cSld>
@@ -15814,6 +18275,152 @@
 </file>
 
 <file path=ppt/slides/slide20.xml><?xml version="1.0" encoding="utf-8"?>
+<p:sld xmlns:a="http://schemas.openxmlformats.org/drawingml/2006/main" xmlns:r="http://schemas.openxmlformats.org/officeDocument/2006/relationships" xmlns:p="http://schemas.openxmlformats.org/presentationml/2006/main" show="0">
+  <p:cSld>
+    <p:spTree>
+      <p:nvGrpSpPr>
+        <p:cNvPr id="1" name=""/>
+        <p:cNvGrpSpPr/>
+        <p:nvPr/>
+      </p:nvGrpSpPr>
+      <p:grpSpPr>
+        <a:xfrm>
+          <a:off x="0" y="0"/>
+          <a:ext cx="0" cy="0"/>
+          <a:chOff x="0" y="0"/>
+          <a:chExt cx="0" cy="0"/>
+        </a:xfrm>
+      </p:grpSpPr>
+      <p:sp>
+        <p:nvSpPr>
+          <p:cNvPr id="2" name="Title 1">
+            <a:extLst>
+              <a:ext uri="{FF2B5EF4-FFF2-40B4-BE49-F238E27FC236}">
+                <a16:creationId xmlns:a16="http://schemas.microsoft.com/office/drawing/2014/main" id="{0F78285E-C5EB-4EB2-B52D-9EA53F184AA0}"/>
+              </a:ext>
+            </a:extLst>
+          </p:cNvPr>
+          <p:cNvSpPr>
+            <a:spLocks noGrp="1"/>
+          </p:cNvSpPr>
+          <p:nvPr>
+            <p:ph type="title"/>
+          </p:nvPr>
+        </p:nvSpPr>
+        <p:spPr/>
+        <p:txBody>
+          <a:bodyPr/>
+          <a:lstStyle/>
+          <a:p>
+            <a:r>
+              <a:rPr lang="en-US" dirty="0"/>
+              <a:t>Widefield ODMR</a:t>
+            </a:r>
+            <a:endParaRPr lang="en-IL" dirty="0"/>
+          </a:p>
+        </p:txBody>
+      </p:sp>
+      <p:sp>
+        <p:nvSpPr>
+          <p:cNvPr id="3" name="Content Placeholder 2">
+            <a:extLst>
+              <a:ext uri="{FF2B5EF4-FFF2-40B4-BE49-F238E27FC236}">
+                <a16:creationId xmlns:a16="http://schemas.microsoft.com/office/drawing/2014/main" id="{789FD1C7-ADC9-407A-BAE9-AE11567B5EC3}"/>
+              </a:ext>
+            </a:extLst>
+          </p:cNvPr>
+          <p:cNvSpPr>
+            <a:spLocks noGrp="1"/>
+          </p:cNvSpPr>
+          <p:nvPr>
+            <p:ph idx="1"/>
+          </p:nvPr>
+        </p:nvSpPr>
+        <p:spPr>
+          <a:xfrm>
+            <a:off x="838200" y="1825625"/>
+            <a:ext cx="5449824" cy="4351338"/>
+          </a:xfrm>
+        </p:spPr>
+        <p:txBody>
+          <a:bodyPr/>
+          <a:lstStyle/>
+          <a:p>
+            <a:endParaRPr lang="en-US" dirty="0"/>
+          </a:p>
+          <a:p>
+            <a:r>
+              <a:rPr lang="en-US" dirty="0"/>
+              <a:t>If it has high enough FPS, can do  quick measurement without reference.</a:t>
+            </a:r>
+          </a:p>
+          <a:p>
+            <a:endParaRPr lang="en-US" dirty="0"/>
+          </a:p>
+          <a:p>
+            <a:r>
+              <a:rPr lang="en-US" dirty="0"/>
+              <a:t>Frequency change is ~200ns long.</a:t>
+            </a:r>
+            <a:br>
+              <a:rPr lang="en-US" dirty="0"/>
+            </a:br>
+            <a:r>
+              <a:rPr lang="en-US" dirty="0"/>
+              <a:t>1us added for clarity.</a:t>
+            </a:r>
+          </a:p>
+        </p:txBody>
+      </p:sp>
+      <p:pic>
+        <p:nvPicPr>
+          <p:cNvPr id="5" name="Picture 4">
+            <a:extLst>
+              <a:ext uri="{FF2B5EF4-FFF2-40B4-BE49-F238E27FC236}">
+                <a16:creationId xmlns:a16="http://schemas.microsoft.com/office/drawing/2014/main" id="{5B6ABBE8-295C-49AE-85A8-CC509FAE01F8}"/>
+              </a:ext>
+            </a:extLst>
+          </p:cNvPr>
+          <p:cNvPicPr>
+            <a:picLocks noChangeAspect="1"/>
+          </p:cNvPicPr>
+          <p:nvPr/>
+        </p:nvPicPr>
+        <p:blipFill rotWithShape="1">
+          <a:blip r:embed="rId2">
+            <a:extLst>
+              <a:ext uri="{28A0092B-C50C-407E-A947-70E740481C1C}">
+                <a14:useLocalDpi xmlns:a14="http://schemas.microsoft.com/office/drawing/2010/main" val="0"/>
+              </a:ext>
+            </a:extLst>
+          </a:blip>
+          <a:srcRect l="6465" t="9144" r="4426" b="8108"/>
+          <a:stretch/>
+        </p:blipFill>
+        <p:spPr>
+          <a:xfrm>
+            <a:off x="6355080" y="1508760"/>
+            <a:ext cx="5449824" cy="4351338"/>
+          </a:xfrm>
+          <a:prstGeom prst="rect">
+            <a:avLst/>
+          </a:prstGeom>
+        </p:spPr>
+      </p:pic>
+    </p:spTree>
+    <p:extLst>
+      <p:ext uri="{BB962C8B-B14F-4D97-AF65-F5344CB8AC3E}">
+        <p14:creationId xmlns:p14="http://schemas.microsoft.com/office/powerpoint/2010/main" val="1211262777"/>
+      </p:ext>
+    </p:extLst>
+  </p:cSld>
+  <p:clrMapOvr>
+    <a:masterClrMapping/>
+  </p:clrMapOvr>
+</p:sld>
+</file>
+
+<file path=ppt/slides/slide21.xml><?xml version="1.0" encoding="utf-8"?>
 <p:sld xmlns:a="http://schemas.openxmlformats.org/drawingml/2006/main" xmlns:r="http://schemas.openxmlformats.org/officeDocument/2006/relationships" xmlns:p="http://schemas.openxmlformats.org/presentationml/2006/main" show="0">
   <p:cSld>
     <p:spTree>
@@ -19563,12 +22170,6 @@
 </file>
 
 <file path=customXml/item1.xml><?xml version="1.0" encoding="utf-8"?>
-<p:properties xmlns:p="http://schemas.microsoft.com/office/2006/metadata/properties" xmlns:xsi="http://www.w3.org/2001/XMLSchema-instance" xmlns:pc="http://schemas.microsoft.com/office/infopath/2007/PartnerControls">
-  <documentManagement/>
-</p:properties>
-</file>
-
-<file path=customXml/item2.xml><?xml version="1.0" encoding="utf-8"?>
 <ct:contentTypeSchema xmlns:ct="http://schemas.microsoft.com/office/2006/metadata/contentType" xmlns:ma="http://schemas.microsoft.com/office/2006/metadata/properties/metaAttributes" ct:_="" ma:_="" ma:contentTypeName="מסמך" ma:contentTypeID="0x010100E2458A921CE957458955FD914EBC9751" ma:contentTypeVersion="2" ma:contentTypeDescription="צור מסמך חדש." ma:contentTypeScope="" ma:versionID="90e11155844fde3e0f83462bc668778e">
   <xsd:schema xmlns:xsd="http://www.w3.org/2001/XMLSchema" xmlns:xs="http://www.w3.org/2001/XMLSchema" xmlns:p="http://schemas.microsoft.com/office/2006/metadata/properties" xmlns:ns3="391d3780-23f5-43ba-939c-282d032ea792" targetNamespace="http://schemas.microsoft.com/office/2006/metadata/properties" ma:root="true" ma:fieldsID="2d25cf9d72d067bf777db363b7f2bae7" ns3:_="">
     <xsd:import namespace="391d3780-23f5-43ba-939c-282d032ea792"/>
@@ -19700,6 +22301,12 @@
 </ct:contentTypeSchema>
 </file>
 
+<file path=customXml/item2.xml><?xml version="1.0" encoding="utf-8"?>
+<p:properties xmlns:p="http://schemas.microsoft.com/office/2006/metadata/properties" xmlns:xsi="http://www.w3.org/2001/XMLSchema-instance" xmlns:pc="http://schemas.microsoft.com/office/infopath/2007/PartnerControls">
+  <documentManagement/>
+</p:properties>
+</file>
+
 <file path=customXml/item3.xml><?xml version="1.0" encoding="utf-8"?>
 <?mso-contentType ?>
 <FormTemplates xmlns="http://schemas.microsoft.com/sharepoint/v3/contenttype/forms">
@@ -19710,22 +22317,6 @@
 </file>
 
 <file path=customXml/itemProps1.xml><?xml version="1.0" encoding="utf-8"?>
-<ds:datastoreItem xmlns:ds="http://schemas.openxmlformats.org/officeDocument/2006/customXml" ds:itemID="{48BF03AE-ED37-419D-A726-CD3EC5004ECC}">
-  <ds:schemaRefs>
-    <ds:schemaRef ds:uri="http://schemas.microsoft.com/office/2006/documentManagement/types"/>
-    <ds:schemaRef ds:uri="http://schemas.microsoft.com/office/2006/metadata/properties"/>
-    <ds:schemaRef ds:uri="http://www.w3.org/XML/1998/namespace"/>
-    <ds:schemaRef ds:uri="http://schemas.microsoft.com/office/infopath/2007/PartnerControls"/>
-    <ds:schemaRef ds:uri="391d3780-23f5-43ba-939c-282d032ea792"/>
-    <ds:schemaRef ds:uri="http://purl.org/dc/elements/1.1/"/>
-    <ds:schemaRef ds:uri="http://purl.org/dc/dcmitype/"/>
-    <ds:schemaRef ds:uri="http://schemas.openxmlformats.org/package/2006/metadata/core-properties"/>
-    <ds:schemaRef ds:uri="http://purl.org/dc/terms/"/>
-  </ds:schemaRefs>
-</ds:datastoreItem>
-</file>
-
-<file path=customXml/itemProps2.xml><?xml version="1.0" encoding="utf-8"?>
 <ds:datastoreItem xmlns:ds="http://schemas.openxmlformats.org/officeDocument/2006/customXml" ds:itemID="{CCB73219-88C7-4D46-951C-E5B173A0B137}">
   <ds:schemaRefs>
     <ds:schemaRef ds:uri="http://schemas.microsoft.com/office/2006/metadata/contentType"/>
@@ -19743,6 +22334,22 @@
 </ds:datastoreItem>
 </file>
 
+<file path=customXml/itemProps2.xml><?xml version="1.0" encoding="utf-8"?>
+<ds:datastoreItem xmlns:ds="http://schemas.openxmlformats.org/officeDocument/2006/customXml" ds:itemID="{48BF03AE-ED37-419D-A726-CD3EC5004ECC}">
+  <ds:schemaRefs>
+    <ds:schemaRef ds:uri="http://schemas.microsoft.com/office/2006/documentManagement/types"/>
+    <ds:schemaRef ds:uri="http://schemas.microsoft.com/office/2006/metadata/properties"/>
+    <ds:schemaRef ds:uri="http://www.w3.org/XML/1998/namespace"/>
+    <ds:schemaRef ds:uri="http://schemas.microsoft.com/office/infopath/2007/PartnerControls"/>
+    <ds:schemaRef ds:uri="391d3780-23f5-43ba-939c-282d032ea792"/>
+    <ds:schemaRef ds:uri="http://purl.org/dc/elements/1.1/"/>
+    <ds:schemaRef ds:uri="http://purl.org/dc/dcmitype/"/>
+    <ds:schemaRef ds:uri="http://schemas.openxmlformats.org/package/2006/metadata/core-properties"/>
+    <ds:schemaRef ds:uri="http://purl.org/dc/terms/"/>
+  </ds:schemaRefs>
+</ds:datastoreItem>
+</file>
+
 <file path=customXml/itemProps3.xml><?xml version="1.0" encoding="utf-8"?>
 <ds:datastoreItem xmlns:ds="http://schemas.openxmlformats.org/officeDocument/2006/customXml" ds:itemID="{F1E87494-DF25-47F1-B68C-87081AE5EB8F}">
   <ds:schemaRefs>

</xml_diff>